<commit_message>
Atualizar Engage e inserir informações no ACT.
</commit_message>
<xml_diff>
--- a/006 - Projeto Interdisciplinar - Paulo Alceu -  TEMPLATE CBL-SE Canvases (1).pptx
+++ b/006 - Projeto Interdisciplinar - Paulo Alceu -  TEMPLATE CBL-SE Canvases (1).pptx
@@ -560,6 +560,72 @@
 </p:notesMaster>
 </file>
 
+<file path=ppt/notesSlides/notesSlide1.xml><?xml version="1.0" encoding="utf-8"?>
+<p:notes xmlns:a="http://schemas.openxmlformats.org/drawingml/2006/main" xmlns:r="http://schemas.openxmlformats.org/officeDocument/2006/relationships" xmlns:p="http://schemas.openxmlformats.org/presentationml/2006/main">
+  <p:cSld>
+    <p:spTree>
+      <p:nvGrpSpPr>
+        <p:cNvPr id="1" name=""/>
+        <p:cNvGrpSpPr/>
+        <p:nvPr/>
+      </p:nvGrpSpPr>
+      <p:grpSpPr>
+        <a:xfrm>
+          <a:off x="0" y="0"/>
+          <a:ext cx="0" cy="0"/>
+          <a:chOff x="0" y="0"/>
+          <a:chExt cx="0" cy="0"/>
+        </a:xfrm>
+      </p:grpSpPr>
+      <p:sp>
+        <p:nvSpPr>
+          <p:cNvPr id="2" name="Espaço Reservado para Imagem de Slide 1"/>
+          <p:cNvSpPr>
+            <a:spLocks noGrp="1" noRot="1" noChangeAspect="1"/>
+          </p:cNvSpPr>
+          <p:nvPr>
+            <p:ph type="sldImg"/>
+          </p:nvPr>
+        </p:nvSpPr>
+        <p:spPr>
+          <a:xfrm>
+            <a:off x="381000" y="685800"/>
+            <a:ext cx="6096000" cy="3429000"/>
+          </a:xfrm>
+        </p:spPr>
+      </p:sp>
+      <p:sp>
+        <p:nvSpPr>
+          <p:cNvPr id="3" name="Espaço Reservado para Anotações 2"/>
+          <p:cNvSpPr>
+            <a:spLocks noGrp="1"/>
+          </p:cNvSpPr>
+          <p:nvPr>
+            <p:ph type="body" idx="1"/>
+          </p:nvPr>
+        </p:nvSpPr>
+        <p:spPr/>
+        <p:txBody>
+          <a:bodyPr/>
+          <a:lstStyle/>
+          <a:p>
+            <a:endParaRPr lang="pt-BR" dirty="0"/>
+          </a:p>
+        </p:txBody>
+      </p:sp>
+    </p:spTree>
+    <p:extLst>
+      <p:ext uri="{BB962C8B-B14F-4D97-AF65-F5344CB8AC3E}">
+        <p14:creationId xmlns:p14="http://schemas.microsoft.com/office/powerpoint/2010/main" val="1541341802"/>
+      </p:ext>
+    </p:extLst>
+  </p:cSld>
+  <p:clrMapOvr>
+    <a:masterClrMapping/>
+  </p:clrMapOvr>
+</p:notes>
+</file>
+
 <file path=ppt/slideLayouts/slideLayout1.xml><?xml version="1.0" encoding="utf-8"?>
 <p:sldLayout xmlns:a="http://schemas.openxmlformats.org/drawingml/2006/main" xmlns:r="http://schemas.openxmlformats.org/officeDocument/2006/relationships" xmlns:p="http://schemas.openxmlformats.org/presentationml/2006/main" type="title">
   <p:cSld name="Title &amp; Subtitle">
@@ -3801,7 +3867,7 @@
           </a:ln>
           <a:extLst>
             <a:ext uri="{C572A759-6A51-4108-AA02-DFA0A04FC94B}">
-              <ma14:wrappingTextBoxFlag xmlns="" xmlns:m="http://schemas.openxmlformats.org/officeDocument/2006/math" xmlns:a14="http://schemas.microsoft.com/office/drawing/2010/main" xmlns:ma14="http://schemas.microsoft.com/office/mac/drawingml/2011/main" val="1"/>
+              <ma14:wrappingTextBoxFlag xmlns:ma14="http://schemas.microsoft.com/office/mac/drawingml/2011/main" xmlns:a14="http://schemas.microsoft.com/office/drawing/2010/main" xmlns:m="http://schemas.openxmlformats.org/officeDocument/2006/math" xmlns="" val="1"/>
             </a:ext>
           </a:extLst>
         </p:spPr>
@@ -3840,7 +3906,7 @@
           </a:ln>
           <a:extLst>
             <a:ext uri="{C572A759-6A51-4108-AA02-DFA0A04FC94B}">
-              <ma14:wrappingTextBoxFlag xmlns="" xmlns:m="http://schemas.openxmlformats.org/officeDocument/2006/math" xmlns:a14="http://schemas.microsoft.com/office/drawing/2010/main" xmlns:ma14="http://schemas.microsoft.com/office/mac/drawingml/2011/main" val="1"/>
+              <ma14:wrappingTextBoxFlag xmlns:ma14="http://schemas.microsoft.com/office/mac/drawingml/2011/main" xmlns:a14="http://schemas.microsoft.com/office/drawing/2010/main" xmlns:m="http://schemas.openxmlformats.org/officeDocument/2006/math" xmlns="" val="1"/>
             </a:ext>
           </a:extLst>
         </p:spPr>
@@ -4983,7 +5049,7 @@
                 <a:effectLst/>
                 <a:extLst>
                   <a:ext uri="{C572A759-6A51-4108-AA02-DFA0A04FC94B}">
-                    <ma14:wrappingTextBoxFlag xmlns="" xmlns:m="http://schemas.openxmlformats.org/officeDocument/2006/math" xmlns:a14="http://schemas.microsoft.com/office/drawing/2010/main" xmlns:ma14="http://schemas.microsoft.com/office/mac/drawingml/2011/main" val="1"/>
+                    <ma14:wrappingTextBoxFlag xmlns:ma14="http://schemas.microsoft.com/office/mac/drawingml/2011/main" xmlns:a14="http://schemas.microsoft.com/office/drawing/2010/main" xmlns:m="http://schemas.openxmlformats.org/officeDocument/2006/math" xmlns="" val="1"/>
                   </a:ext>
                 </a:extLst>
               </p:spPr>
@@ -5035,7 +5101,7 @@
               <a:effectLst/>
               <a:extLst>
                 <a:ext uri="{C572A759-6A51-4108-AA02-DFA0A04FC94B}">
-                  <ma14:wrappingTextBoxFlag xmlns="" xmlns:m="http://schemas.openxmlformats.org/officeDocument/2006/math" xmlns:a14="http://schemas.microsoft.com/office/drawing/2010/main" xmlns:ma14="http://schemas.microsoft.com/office/mac/drawingml/2011/main" val="1"/>
+                  <ma14:wrappingTextBoxFlag xmlns:ma14="http://schemas.microsoft.com/office/mac/drawingml/2011/main" xmlns:a14="http://schemas.microsoft.com/office/drawing/2010/main" xmlns:m="http://schemas.openxmlformats.org/officeDocument/2006/math" xmlns="" val="1"/>
                 </a:ext>
               </a:extLst>
             </p:spPr>
@@ -5164,7 +5230,7 @@
                 <a:effectLst/>
                 <a:extLst>
                   <a:ext uri="{C572A759-6A51-4108-AA02-DFA0A04FC94B}">
-                    <ma14:wrappingTextBoxFlag xmlns="" xmlns:m="http://schemas.openxmlformats.org/officeDocument/2006/math" xmlns:a14="http://schemas.microsoft.com/office/drawing/2010/main" xmlns:ma14="http://schemas.microsoft.com/office/mac/drawingml/2011/main" val="1"/>
+                    <ma14:wrappingTextBoxFlag xmlns:ma14="http://schemas.microsoft.com/office/mac/drawingml/2011/main" xmlns:a14="http://schemas.microsoft.com/office/drawing/2010/main" xmlns:m="http://schemas.openxmlformats.org/officeDocument/2006/math" xmlns="" val="1"/>
                   </a:ext>
                 </a:extLst>
               </p:spPr>
@@ -5215,7 +5281,7 @@
               <a:effectLst/>
               <a:extLst>
                 <a:ext uri="{C572A759-6A51-4108-AA02-DFA0A04FC94B}">
-                  <ma14:wrappingTextBoxFlag xmlns="" xmlns:m="http://schemas.openxmlformats.org/officeDocument/2006/math" xmlns:a14="http://schemas.microsoft.com/office/drawing/2010/main" xmlns:ma14="http://schemas.microsoft.com/office/mac/drawingml/2011/main" val="1"/>
+                  <ma14:wrappingTextBoxFlag xmlns:ma14="http://schemas.microsoft.com/office/mac/drawingml/2011/main" xmlns:a14="http://schemas.microsoft.com/office/drawing/2010/main" xmlns:m="http://schemas.openxmlformats.org/officeDocument/2006/math" xmlns="" val="1"/>
                 </a:ext>
               </a:extLst>
             </p:spPr>
@@ -5345,7 +5411,7 @@
                 <a:effectLst/>
                 <a:extLst>
                   <a:ext uri="{C572A759-6A51-4108-AA02-DFA0A04FC94B}">
-                    <ma14:wrappingTextBoxFlag xmlns="" xmlns:m="http://schemas.openxmlformats.org/officeDocument/2006/math" xmlns:a14="http://schemas.microsoft.com/office/drawing/2010/main" xmlns:ma14="http://schemas.microsoft.com/office/mac/drawingml/2011/main" val="1"/>
+                    <ma14:wrappingTextBoxFlag xmlns:ma14="http://schemas.microsoft.com/office/mac/drawingml/2011/main" xmlns:a14="http://schemas.microsoft.com/office/drawing/2010/main" xmlns:m="http://schemas.openxmlformats.org/officeDocument/2006/math" xmlns="" val="1"/>
                   </a:ext>
                 </a:extLst>
               </p:spPr>
@@ -5396,7 +5462,7 @@
               <a:effectLst/>
               <a:extLst>
                 <a:ext uri="{C572A759-6A51-4108-AA02-DFA0A04FC94B}">
-                  <ma14:wrappingTextBoxFlag xmlns="" xmlns:m="http://schemas.openxmlformats.org/officeDocument/2006/math" xmlns:a14="http://schemas.microsoft.com/office/drawing/2010/main" xmlns:ma14="http://schemas.microsoft.com/office/mac/drawingml/2011/main" val="1"/>
+                  <ma14:wrappingTextBoxFlag xmlns:ma14="http://schemas.microsoft.com/office/mac/drawingml/2011/main" xmlns:a14="http://schemas.microsoft.com/office/drawing/2010/main" xmlns:m="http://schemas.openxmlformats.org/officeDocument/2006/math" xmlns="" val="1"/>
                 </a:ext>
               </a:extLst>
             </p:spPr>
@@ -5523,7 +5589,7 @@
                 <a:effectLst/>
                 <a:extLst>
                   <a:ext uri="{C572A759-6A51-4108-AA02-DFA0A04FC94B}">
-                    <ma14:wrappingTextBoxFlag xmlns="" xmlns:m="http://schemas.openxmlformats.org/officeDocument/2006/math" xmlns:a14="http://schemas.microsoft.com/office/drawing/2010/main" xmlns:ma14="http://schemas.microsoft.com/office/mac/drawingml/2011/main" val="1"/>
+                    <ma14:wrappingTextBoxFlag xmlns:ma14="http://schemas.microsoft.com/office/mac/drawingml/2011/main" xmlns:a14="http://schemas.microsoft.com/office/drawing/2010/main" xmlns:m="http://schemas.openxmlformats.org/officeDocument/2006/math" xmlns="" val="1"/>
                   </a:ext>
                 </a:extLst>
               </p:spPr>
@@ -5574,7 +5640,7 @@
               <a:effectLst/>
               <a:extLst>
                 <a:ext uri="{C572A759-6A51-4108-AA02-DFA0A04FC94B}">
-                  <ma14:wrappingTextBoxFlag xmlns="" xmlns:m="http://schemas.openxmlformats.org/officeDocument/2006/math" xmlns:a14="http://schemas.microsoft.com/office/drawing/2010/main" xmlns:ma14="http://schemas.microsoft.com/office/mac/drawingml/2011/main" val="1"/>
+                  <ma14:wrappingTextBoxFlag xmlns:ma14="http://schemas.microsoft.com/office/mac/drawingml/2011/main" xmlns:a14="http://schemas.microsoft.com/office/drawing/2010/main" xmlns:m="http://schemas.openxmlformats.org/officeDocument/2006/math" xmlns="" val="1"/>
                 </a:ext>
               </a:extLst>
             </p:spPr>
@@ -5643,9 +5709,9 @@
         <p:grpSpPr>
           <a:xfrm>
             <a:off x="82522" y="72009"/>
-            <a:ext cx="24217317" cy="13567452"/>
+            <a:ext cx="24217320" cy="13563052"/>
             <a:chOff x="0" y="0"/>
-            <a:chExt cx="24217316" cy="13567451"/>
+            <a:chExt cx="24217319" cy="13563051"/>
           </a:xfrm>
         </p:grpSpPr>
         <p:grpSp>
@@ -5657,9 +5723,9 @@
           <p:grpSpPr>
             <a:xfrm>
               <a:off x="45453" y="0"/>
-              <a:ext cx="8631360" cy="6648909"/>
+              <a:ext cx="8631362" cy="6648911"/>
               <a:chOff x="0" y="0"/>
-              <a:chExt cx="8631359" cy="6648908"/>
+              <a:chExt cx="8631361" cy="6648910"/>
             </a:xfrm>
           </p:grpSpPr>
           <p:grpSp>
@@ -5671,9 +5737,9 @@
             <p:grpSpPr>
               <a:xfrm>
                 <a:off x="0" y="0"/>
-                <a:ext cx="8631360" cy="6648909"/>
+                <a:ext cx="8631361" cy="6648910"/>
                 <a:chOff x="0" y="0"/>
-                <a:chExt cx="8631359" cy="6648908"/>
+                <a:chExt cx="8631360" cy="6648909"/>
               </a:xfrm>
             </p:grpSpPr>
             <p:sp>
@@ -5716,7 +5782,7 @@
                       <a:sym typeface="Helvetica Neue Medium"/>
                     </a:defRPr>
                   </a:pPr>
-                  <a:endParaRPr/>
+                  <a:endParaRPr dirty="0"/>
                 </a:p>
               </p:txBody>
             </p:sp>
@@ -5728,7 +5794,7 @@
               </p:nvSpPr>
               <p:spPr>
                 <a:xfrm>
-                  <a:off x="300169" y="437516"/>
+                  <a:off x="384249" y="215430"/>
                   <a:ext cx="4159935" cy="660319"/>
                 </a:xfrm>
                 <a:prstGeom prst="rect">
@@ -5742,7 +5808,7 @@
                 <a:effectLst/>
                 <a:extLst>
                   <a:ext uri="{C572A759-6A51-4108-AA02-DFA0A04FC94B}">
-                    <ma14:wrappingTextBoxFlag xmlns="" xmlns:m="http://schemas.openxmlformats.org/officeDocument/2006/math" xmlns:a14="http://schemas.microsoft.com/office/drawing/2010/main" xmlns:ma14="http://schemas.microsoft.com/office/mac/drawingml/2011/main" val="1"/>
+                    <ma14:wrappingTextBoxFlag xmlns:ma14="http://schemas.microsoft.com/office/mac/drawingml/2011/main" xmlns:a14="http://schemas.microsoft.com/office/drawing/2010/main" xmlns:m="http://schemas.openxmlformats.org/officeDocument/2006/math" xmlns="" val="1"/>
                   </a:ext>
                 </a:extLst>
               </p:spPr>
@@ -5765,6 +5831,7 @@
                 </a:lstStyle>
                 <a:p>
                   <a:r>
+                    <a:rPr dirty="0"/>
                     <a:t>Value Proposition</a:t>
                   </a:r>
                 </a:p>
@@ -5779,8 +5846,8 @@
             </p:nvSpPr>
             <p:spPr>
               <a:xfrm>
-                <a:off x="403400" y="1743416"/>
-                <a:ext cx="7827910" cy="535355"/>
+                <a:off x="300169" y="981355"/>
+                <a:ext cx="7827910" cy="5593243"/>
               </a:xfrm>
               <a:prstGeom prst="rect">
                 <a:avLst/>
@@ -5793,7 +5860,7 @@
               <a:effectLst/>
               <a:extLst>
                 <a:ext uri="{C572A759-6A51-4108-AA02-DFA0A04FC94B}">
-                  <ma14:wrappingTextBoxFlag xmlns="" xmlns:m="http://schemas.openxmlformats.org/officeDocument/2006/math" xmlns:a14="http://schemas.microsoft.com/office/drawing/2010/main" xmlns:ma14="http://schemas.microsoft.com/office/mac/drawingml/2011/main" val="1"/>
+                  <ma14:wrappingTextBoxFlag xmlns:ma14="http://schemas.microsoft.com/office/mac/drawingml/2011/main" xmlns:a14="http://schemas.microsoft.com/office/drawing/2010/main" xmlns:m="http://schemas.openxmlformats.org/officeDocument/2006/math" xmlns="" val="1"/>
                 </a:ext>
               </a:extLst>
             </p:spPr>
@@ -5815,9 +5882,168 @@
                 </a:lvl1pPr>
               </a:lstStyle>
               <a:p>
-                <a:r>
-                  <a:t>[a preencher]</a:t>
-                </a:r>
+                <a:pPr marL="342900" indent="-342900" algn="just">
+                  <a:buFont typeface="+mj-lt"/>
+                  <a:buAutoNum type="arabicPeriod"/>
+                </a:pPr>
+                <a:r>
+                  <a:rPr lang="pt-BR" sz="1800" b="1" dirty="0" smtClean="0"/>
+                  <a:t>Facilidade de Uso</a:t>
+                </a:r>
+                <a:r>
+                  <a:rPr lang="pt-BR" sz="1800" b="1" dirty="0"/>
+                  <a:t>: </a:t>
+                </a:r>
+                <a:r>
+                  <a:rPr lang="pt-BR" sz="1800" dirty="0"/>
+                  <a:t>Interface intuitiva que torna o controle financeiro acessível a todos, independentemente do nível de conhecimento financeiro</a:t>
+                </a:r>
+                <a:r>
+                  <a:rPr lang="pt-BR" sz="1800" dirty="0" smtClean="0"/>
+                  <a:t>.</a:t>
+                </a:r>
+              </a:p>
+              <a:p>
+                <a:pPr marL="342900" indent="-342900" algn="just">
+                  <a:buFont typeface="+mj-lt"/>
+                  <a:buAutoNum type="arabicPeriod"/>
+                </a:pPr>
+                <a:endParaRPr lang="pt-BR" sz="1800" dirty="0"/>
+              </a:p>
+              <a:p>
+                <a:pPr marL="342900" indent="-342900" algn="just">
+                  <a:buFont typeface="+mj-lt"/>
+                  <a:buAutoNum type="arabicPeriod"/>
+                </a:pPr>
+                <a:r>
+                  <a:rPr lang="pt-BR" sz="1800" b="1" dirty="0" smtClean="0"/>
+                  <a:t>Visibilidade </a:t>
+                </a:r>
+                <a:r>
+                  <a:rPr lang="pt-BR" sz="1800" b="1" dirty="0"/>
+                  <a:t>em Tempo Real: </a:t>
+                </a:r>
+                <a:r>
+                  <a:rPr lang="pt-BR" sz="1800" dirty="0"/>
+                  <a:t>Acompanhamento de despesas e receitas em tempo real, permitindo ajustes imediatos no orçamento</a:t>
+                </a:r>
+                <a:r>
+                  <a:rPr lang="pt-BR" sz="1800" dirty="0" smtClean="0"/>
+                  <a:t>.</a:t>
+                </a:r>
+              </a:p>
+              <a:p>
+                <a:pPr marL="342900" indent="-342900" algn="just">
+                  <a:buFont typeface="+mj-lt"/>
+                  <a:buAutoNum type="arabicPeriod"/>
+                </a:pPr>
+                <a:endParaRPr lang="pt-BR" sz="1800" dirty="0"/>
+              </a:p>
+              <a:p>
+                <a:pPr marL="342900" indent="-342900" algn="just">
+                  <a:buFont typeface="+mj-lt"/>
+                  <a:buAutoNum type="arabicPeriod"/>
+                </a:pPr>
+                <a:r>
+                  <a:rPr lang="pt-BR" sz="1800" b="1" dirty="0" smtClean="0"/>
+                  <a:t>Personalização </a:t>
+                </a:r>
+                <a:r>
+                  <a:rPr lang="pt-BR" sz="1800" b="1" dirty="0"/>
+                  <a:t>de Metas: </a:t>
+                </a:r>
+                <a:r>
+                  <a:rPr lang="pt-BR" sz="1800" dirty="0"/>
+                  <a:t>Usuários podem definir metas financeiras personalizadas e receber recomendações baseadas em seu comportamento de gasto</a:t>
+                </a:r>
+                <a:r>
+                  <a:rPr lang="pt-BR" sz="1800" dirty="0" smtClean="0"/>
+                  <a:t>.</a:t>
+                </a:r>
+              </a:p>
+              <a:p>
+                <a:pPr marL="342900" indent="-342900" algn="just">
+                  <a:buFont typeface="+mj-lt"/>
+                  <a:buAutoNum type="arabicPeriod"/>
+                </a:pPr>
+                <a:endParaRPr lang="pt-BR" sz="1800" dirty="0"/>
+              </a:p>
+              <a:p>
+                <a:pPr marL="342900" indent="-342900" algn="just">
+                  <a:buFont typeface="+mj-lt"/>
+                  <a:buAutoNum type="arabicPeriod"/>
+                </a:pPr>
+                <a:r>
+                  <a:rPr lang="pt-BR" sz="1800" b="1" dirty="0" smtClean="0"/>
+                  <a:t>Relatórios </a:t>
+                </a:r>
+                <a:r>
+                  <a:rPr lang="pt-BR" sz="1800" b="1" dirty="0"/>
+                  <a:t>Detalhados: </a:t>
+                </a:r>
+                <a:r>
+                  <a:rPr lang="pt-BR" sz="1800" dirty="0"/>
+                  <a:t>Geração de relatórios visuais e analíticos que ajudam a identificar padrões de gasto e áreas de economia</a:t>
+                </a:r>
+                <a:r>
+                  <a:rPr lang="pt-BR" sz="1800" dirty="0" smtClean="0"/>
+                  <a:t>.</a:t>
+                </a:r>
+              </a:p>
+              <a:p>
+                <a:pPr marL="342900" indent="-342900" algn="just">
+                  <a:buFont typeface="+mj-lt"/>
+                  <a:buAutoNum type="arabicPeriod"/>
+                </a:pPr>
+                <a:endParaRPr lang="pt-BR" sz="1800" dirty="0"/>
+              </a:p>
+              <a:p>
+                <a:pPr marL="342900" indent="-342900" algn="just">
+                  <a:buFont typeface="+mj-lt"/>
+                  <a:buAutoNum type="arabicPeriod"/>
+                </a:pPr>
+                <a:r>
+                  <a:rPr lang="pt-BR" sz="1800" b="1" dirty="0" smtClean="0"/>
+                  <a:t>Segurança </a:t>
+                </a:r>
+                <a:r>
+                  <a:rPr lang="pt-BR" sz="1800" b="1" dirty="0"/>
+                  <a:t>de Dados: </a:t>
+                </a:r>
+                <a:r>
+                  <a:rPr lang="pt-BR" sz="1800" dirty="0" smtClean="0"/>
+                  <a:t>Proteção de </a:t>
+                </a:r>
+                <a:r>
+                  <a:rPr lang="pt-BR" sz="1800" dirty="0"/>
+                  <a:t>dados financeiros dos usuários, garantindo privacidade e segurança</a:t>
+                </a:r>
+                <a:r>
+                  <a:rPr lang="pt-BR" sz="1800" dirty="0" smtClean="0"/>
+                  <a:t>.</a:t>
+                </a:r>
+              </a:p>
+              <a:p>
+                <a:pPr marL="342900" indent="-342900" algn="just">
+                  <a:buFont typeface="+mj-lt"/>
+                  <a:buAutoNum type="arabicPeriod"/>
+                </a:pPr>
+                <a:endParaRPr lang="pt-BR" sz="1800" dirty="0"/>
+              </a:p>
+              <a:p>
+                <a:pPr marL="342900" indent="-342900" algn="just">
+                  <a:buFont typeface="+mj-lt"/>
+                  <a:buAutoNum type="arabicPeriod"/>
+                </a:pPr>
+                <a:r>
+                  <a:rPr lang="pt-BR" sz="1800" b="1" dirty="0"/>
+                  <a:t>Educação Financeira</a:t>
+                </a:r>
+                <a:r>
+                  <a:rPr lang="pt-BR" sz="1800" dirty="0"/>
+                  <a:t>: Oferecer conteúdos educativos, como artigos e vídeos, para ajudar os usuários a melhorar sua literacia financeira e tomar decisões mais informadas.</a:t>
+                </a:r>
+                <a:endParaRPr sz="1800" dirty="0"/>
               </a:p>
             </p:txBody>
           </p:sp>
@@ -5830,10 +6056,10 @@
           </p:nvGrpSpPr>
           <p:grpSpPr>
             <a:xfrm>
-              <a:off x="14916016" y="6745247"/>
-              <a:ext cx="9293743" cy="6822205"/>
-              <a:chOff x="0" y="0"/>
-              <a:chExt cx="9293742" cy="6822203"/>
+              <a:off x="14916016" y="4681700"/>
+              <a:ext cx="9293745" cy="8868168"/>
+              <a:chOff x="0" y="-2063546"/>
+              <a:chExt cx="9293744" cy="8868165"/>
             </a:xfrm>
           </p:grpSpPr>
           <p:grpSp>
@@ -5844,10 +6070,10 @@
             </p:nvGrpSpPr>
             <p:grpSpPr>
               <a:xfrm>
-                <a:off x="0" y="0"/>
-                <a:ext cx="9293743" cy="6822204"/>
-                <a:chOff x="0" y="0"/>
-                <a:chExt cx="9293742" cy="6822203"/>
+                <a:off x="0" y="-2063546"/>
+                <a:ext cx="9293744" cy="8868165"/>
+                <a:chOff x="0" y="-2063546"/>
+                <a:chExt cx="9293743" cy="8868164"/>
               </a:xfrm>
             </p:grpSpPr>
             <p:sp>
@@ -5858,8 +6084,8 @@
               </p:nvSpPr>
               <p:spPr>
                 <a:xfrm>
-                  <a:off x="0" y="0"/>
-                  <a:ext cx="9293743" cy="6822204"/>
+                  <a:off x="0" y="-2063546"/>
+                  <a:ext cx="9293743" cy="8868164"/>
                 </a:xfrm>
                 <a:prstGeom prst="rect">
                   <a:avLst/>
@@ -5902,7 +6128,7 @@
               </p:nvSpPr>
               <p:spPr>
                 <a:xfrm>
-                  <a:off x="179968" y="366244"/>
+                  <a:off x="290675" y="-1944860"/>
                   <a:ext cx="5481277" cy="660320"/>
                 </a:xfrm>
                 <a:prstGeom prst="rect">
@@ -5916,7 +6142,7 @@
                 <a:effectLst/>
                 <a:extLst>
                   <a:ext uri="{C572A759-6A51-4108-AA02-DFA0A04FC94B}">
-                    <ma14:wrappingTextBoxFlag xmlns="" xmlns:m="http://schemas.openxmlformats.org/officeDocument/2006/math" xmlns:a14="http://schemas.microsoft.com/office/drawing/2010/main" xmlns:ma14="http://schemas.microsoft.com/office/mac/drawingml/2011/main" val="1"/>
+                    <ma14:wrappingTextBoxFlag xmlns:ma14="http://schemas.microsoft.com/office/mac/drawingml/2011/main" xmlns:a14="http://schemas.microsoft.com/office/drawing/2010/main" xmlns:m="http://schemas.openxmlformats.org/officeDocument/2006/math" xmlns="" val="1"/>
                   </a:ext>
                 </a:extLst>
               </p:spPr>
@@ -5939,6 +6165,7 @@
                 </a:lstStyle>
                 <a:p>
                   <a:r>
+                    <a:rPr dirty="0"/>
                     <a:t>Design rules</a:t>
                   </a:r>
                 </a:p>
@@ -5953,8 +6180,8 @@
             </p:nvSpPr>
             <p:spPr>
               <a:xfrm>
-                <a:off x="259884" y="1790251"/>
-                <a:ext cx="8773974" cy="535355"/>
+                <a:off x="93762" y="-2045961"/>
+                <a:ext cx="9121334" cy="8609452"/>
               </a:xfrm>
               <a:prstGeom prst="rect">
                 <a:avLst/>
@@ -5967,7 +6194,7 @@
               <a:effectLst/>
               <a:extLst>
                 <a:ext uri="{C572A759-6A51-4108-AA02-DFA0A04FC94B}">
-                  <ma14:wrappingTextBoxFlag xmlns="" xmlns:m="http://schemas.openxmlformats.org/officeDocument/2006/math" xmlns:a14="http://schemas.microsoft.com/office/drawing/2010/main" xmlns:ma14="http://schemas.microsoft.com/office/mac/drawingml/2011/main" val="1"/>
+                  <ma14:wrappingTextBoxFlag xmlns:ma14="http://schemas.microsoft.com/office/mac/drawingml/2011/main" xmlns:a14="http://schemas.microsoft.com/office/drawing/2010/main" xmlns:m="http://schemas.openxmlformats.org/officeDocument/2006/math" xmlns="" val="1"/>
                 </a:ext>
               </a:extLst>
             </p:spPr>
@@ -5989,9 +6216,235 @@
                 </a:lvl1pPr>
               </a:lstStyle>
               <a:p>
-                <a:r>
-                  <a:t>[a preencher]</a:t>
-                </a:r>
+                <a:pPr algn="just"/>
+                <a:endParaRPr lang="pt-BR" sz="1600" b="1" dirty="0" smtClean="0"/>
+              </a:p>
+              <a:p>
+                <a:pPr algn="just"/>
+                <a:endParaRPr lang="pt-BR" sz="1800" b="1" dirty="0"/>
+              </a:p>
+              <a:p>
+                <a:pPr algn="just"/>
+                <a:endParaRPr lang="pt-BR" sz="1800" b="1" dirty="0" smtClean="0"/>
+              </a:p>
+              <a:p>
+                <a:pPr algn="just"/>
+                <a:endParaRPr lang="pt-BR" sz="1800" b="1" dirty="0"/>
+              </a:p>
+              <a:p>
+                <a:pPr algn="just"/>
+                <a:r>
+                  <a:rPr lang="pt-BR" sz="1800" b="1" dirty="0" smtClean="0"/>
+                  <a:t>Simplicidade</a:t>
+                </a:r>
+                <a:r>
+                  <a:rPr lang="pt-BR" sz="1800" b="1" dirty="0"/>
+                  <a:t>: </a:t>
+                </a:r>
+                <a:r>
+                  <a:rPr lang="pt-BR" sz="1800" dirty="0"/>
+                  <a:t>Design limpo e minimalista que facilita a navegação</a:t>
+                </a:r>
+                <a:r>
+                  <a:rPr lang="pt-BR" sz="1800" dirty="0" smtClean="0"/>
+                  <a:t>.</a:t>
+                </a:r>
+              </a:p>
+              <a:p>
+                <a:pPr algn="just"/>
+                <a:endParaRPr lang="pt-BR" sz="1800" dirty="0"/>
+              </a:p>
+              <a:p>
+                <a:pPr algn="just"/>
+                <a:r>
+                  <a:rPr lang="pt-BR" sz="1800" b="1" dirty="0" smtClean="0"/>
+                  <a:t>Consistência</a:t>
+                </a:r>
+                <a:r>
+                  <a:rPr lang="pt-BR" sz="1800" b="1" dirty="0"/>
+                  <a:t>: </a:t>
+                </a:r>
+                <a:r>
+                  <a:rPr lang="pt-BR" sz="1800" dirty="0" smtClean="0"/>
+                  <a:t>Elementos </a:t>
+                </a:r>
+                <a:r>
+                  <a:rPr lang="pt-BR" sz="1800" dirty="0"/>
+                  <a:t>visuais e interações devem ser consistentes em todas as telas</a:t>
+                </a:r>
+                <a:r>
+                  <a:rPr lang="pt-BR" sz="1800" dirty="0" smtClean="0"/>
+                  <a:t>.</a:t>
+                </a:r>
+              </a:p>
+              <a:p>
+                <a:pPr algn="just"/>
+                <a:endParaRPr lang="pt-BR" sz="1800" dirty="0"/>
+              </a:p>
+              <a:p>
+                <a:pPr algn="just"/>
+                <a:r>
+                  <a:rPr lang="pt-BR" sz="1800" b="1" dirty="0" smtClean="0"/>
+                  <a:t>Acessibilidade</a:t>
+                </a:r>
+                <a:r>
+                  <a:rPr lang="pt-BR" sz="1800" b="1" dirty="0"/>
+                  <a:t>: </a:t>
+                </a:r>
+                <a:r>
+                  <a:rPr lang="pt-BR" sz="1800" dirty="0"/>
+                  <a:t>Garantir que o aplicativo seja acessível para pessoas com </a:t>
+                </a:r>
+                <a:r>
+                  <a:rPr lang="pt-BR" sz="1800" dirty="0" smtClean="0"/>
+                  <a:t>deficiência.</a:t>
+                </a:r>
+              </a:p>
+              <a:p>
+                <a:pPr algn="just"/>
+                <a:endParaRPr lang="pt-BR" sz="1800" dirty="0"/>
+              </a:p>
+              <a:p>
+                <a:pPr algn="just"/>
+                <a:r>
+                  <a:rPr lang="pt-BR" sz="1800" b="1" dirty="0" smtClean="0"/>
+                  <a:t>Hierarquia </a:t>
+                </a:r>
+                <a:r>
+                  <a:rPr lang="pt-BR" sz="1800" b="1" dirty="0"/>
+                  <a:t>Visual: </a:t>
+                </a:r>
+                <a:r>
+                  <a:rPr lang="pt-BR" sz="1800" dirty="0"/>
+                  <a:t>Utilizar tamanho, cor e espaço para destacar informações importantes e guiar a atenção do usuário</a:t>
+                </a:r>
+                <a:r>
+                  <a:rPr lang="pt-BR" sz="1800" dirty="0" smtClean="0"/>
+                  <a:t>.</a:t>
+                </a:r>
+              </a:p>
+              <a:p>
+                <a:pPr algn="just"/>
+                <a:endParaRPr lang="pt-BR" sz="1800" dirty="0"/>
+              </a:p>
+              <a:p>
+                <a:pPr algn="just"/>
+                <a:r>
+                  <a:rPr lang="pt-BR" sz="1800" b="1" dirty="0"/>
+                  <a:t>Navegação Intuitiva</a:t>
+                </a:r>
+                <a:r>
+                  <a:rPr lang="pt-BR" sz="1800" dirty="0"/>
+                  <a:t>: Estruturar menus e opções de navegação de forma lógica e previsível, permitindo que os usuários encontrem o que precisam rapidamente</a:t>
+                </a:r>
+                <a:r>
+                  <a:rPr lang="pt-BR" sz="1800" dirty="0" smtClean="0"/>
+                  <a:t>.</a:t>
+                </a:r>
+              </a:p>
+              <a:p>
+                <a:pPr algn="just"/>
+                <a:endParaRPr lang="pt-BR" sz="1800" dirty="0"/>
+              </a:p>
+              <a:p>
+                <a:pPr algn="just"/>
+                <a:r>
+                  <a:rPr lang="pt-BR" sz="1800" b="1" dirty="0"/>
+                  <a:t>Espaçamento Adequado</a:t>
+                </a:r>
+                <a:r>
+                  <a:rPr lang="pt-BR" sz="1800" dirty="0"/>
+                  <a:t>: Garantir que os elementos tenham espaço suficiente entre si para evitar toques acidentais e facilitar a leitura</a:t>
+                </a:r>
+                <a:r>
+                  <a:rPr lang="pt-BR" sz="1800" dirty="0" smtClean="0"/>
+                  <a:t>.</a:t>
+                </a:r>
+              </a:p>
+              <a:p>
+                <a:pPr algn="just"/>
+                <a:endParaRPr lang="pt-BR" sz="1800" dirty="0"/>
+              </a:p>
+              <a:p>
+                <a:pPr algn="just"/>
+                <a:r>
+                  <a:rPr lang="pt-BR" sz="1800" b="1" dirty="0"/>
+                  <a:t>Tipografia Clara: </a:t>
+                </a:r>
+                <a:r>
+                  <a:rPr lang="pt-BR" sz="1800" dirty="0"/>
+                  <a:t>Usar fontes legíveis e consistentes, priorizando a clareza em tamanhos de texto e hierarquia visual</a:t>
+                </a:r>
+                <a:r>
+                  <a:rPr lang="pt-BR" sz="1800" dirty="0" smtClean="0"/>
+                  <a:t>.</a:t>
+                </a:r>
+              </a:p>
+              <a:p>
+                <a:pPr algn="just"/>
+                <a:endParaRPr lang="pt-BR" sz="1800" dirty="0"/>
+              </a:p>
+              <a:p>
+                <a:pPr algn="just"/>
+                <a:r>
+                  <a:rPr lang="pt-BR" sz="1800" b="1" dirty="0" smtClean="0"/>
+                  <a:t>Cores: </a:t>
+                </a:r>
+                <a:r>
+                  <a:rPr lang="pt-BR" sz="1800" dirty="0"/>
+                  <a:t>Aplicar cores de forma estratégica para transmitir emoções e priorizar </a:t>
+                </a:r>
+                <a:r>
+                  <a:rPr lang="pt-BR" sz="1800" dirty="0" smtClean="0"/>
+                  <a:t>informações.</a:t>
+                </a:r>
+              </a:p>
+              <a:p>
+                <a:pPr algn="just"/>
+                <a:endParaRPr lang="pt-BR" sz="1800" dirty="0"/>
+              </a:p>
+              <a:p>
+                <a:pPr algn="just"/>
+                <a:r>
+                  <a:rPr lang="pt-BR" sz="1800" b="1" dirty="0"/>
+                  <a:t>Responsividade: </a:t>
+                </a:r>
+                <a:r>
+                  <a:rPr lang="pt-BR" sz="1800" dirty="0"/>
+                  <a:t>Garantir que o design funcione bem em diferentes tamanhos de tela, desde </a:t>
+                </a:r>
+                <a:r>
+                  <a:rPr lang="pt-BR" sz="1800" dirty="0" smtClean="0"/>
+                  <a:t>smartphones </a:t>
+                </a:r>
+                <a:r>
+                  <a:rPr lang="pt-BR" sz="1800" dirty="0"/>
+                  <a:t>até tablets</a:t>
+                </a:r>
+                <a:r>
+                  <a:rPr lang="pt-BR" sz="1800" dirty="0" smtClean="0"/>
+                  <a:t>.</a:t>
+                </a:r>
+              </a:p>
+              <a:p>
+                <a:pPr algn="just"/>
+                <a:endParaRPr lang="pt-BR" sz="1800" dirty="0"/>
+              </a:p>
+              <a:p>
+                <a:pPr algn="just"/>
+                <a:r>
+                  <a:rPr lang="pt-BR" sz="1800" b="1" dirty="0" smtClean="0"/>
+                  <a:t>Acessibilidade</a:t>
+                </a:r>
+                <a:r>
+                  <a:rPr lang="pt-BR" sz="1800" b="1" dirty="0"/>
+                  <a:t>: </a:t>
+                </a:r>
+                <a:r>
+                  <a:rPr lang="pt-BR" sz="1800" dirty="0"/>
+                  <a:t>Incluir opções de contraste alto e suporte a leitores de tela, garantindo que todos os usuários possam acessar e utilizar o aplicativo.</a:t>
+                </a:r>
+                <a:endParaRPr sz="1800" dirty="0"/>
               </a:p>
             </p:txBody>
           </p:sp>
@@ -6005,9 +6458,9 @@
           <p:grpSpPr>
             <a:xfrm>
               <a:off x="8758886" y="18224"/>
-              <a:ext cx="6082616" cy="6612461"/>
+              <a:ext cx="6082617" cy="6612462"/>
               <a:chOff x="0" y="0"/>
-              <a:chExt cx="6082614" cy="6612459"/>
+              <a:chExt cx="6082615" cy="6612460"/>
             </a:xfrm>
           </p:grpSpPr>
           <p:grpSp>
@@ -6090,7 +6543,7 @@
                 <a:effectLst/>
                 <a:extLst>
                   <a:ext uri="{C572A759-6A51-4108-AA02-DFA0A04FC94B}">
-                    <ma14:wrappingTextBoxFlag xmlns="" xmlns:m="http://schemas.openxmlformats.org/officeDocument/2006/math" xmlns:a14="http://schemas.microsoft.com/office/drawing/2010/main" xmlns:ma14="http://schemas.microsoft.com/office/mac/drawingml/2011/main" val="1"/>
+                    <ma14:wrappingTextBoxFlag xmlns:ma14="http://schemas.microsoft.com/office/mac/drawingml/2011/main" xmlns:a14="http://schemas.microsoft.com/office/drawing/2010/main" xmlns:m="http://schemas.openxmlformats.org/officeDocument/2006/math" xmlns="" val="1"/>
                   </a:ext>
                 </a:extLst>
               </p:spPr>
@@ -6113,6 +6566,7 @@
                 </a:lstStyle>
                 <a:p>
                   <a:r>
+                    <a:rPr dirty="0"/>
                     <a:t>Platform/Technologies</a:t>
                   </a:r>
                 </a:p>
@@ -6127,8 +6581,8 @@
             </p:nvSpPr>
             <p:spPr>
               <a:xfrm>
-                <a:off x="232991" y="1803447"/>
-                <a:ext cx="5342004" cy="535355"/>
+                <a:off x="232991" y="1421244"/>
+                <a:ext cx="5342004" cy="1299762"/>
               </a:xfrm>
               <a:prstGeom prst="rect">
                 <a:avLst/>
@@ -6141,7 +6595,7 @@
               <a:effectLst/>
               <a:extLst>
                 <a:ext uri="{C572A759-6A51-4108-AA02-DFA0A04FC94B}">
-                  <ma14:wrappingTextBoxFlag xmlns="" xmlns:m="http://schemas.openxmlformats.org/officeDocument/2006/math" xmlns:a14="http://schemas.microsoft.com/office/drawing/2010/main" xmlns:ma14="http://schemas.microsoft.com/office/mac/drawingml/2011/main" val="1"/>
+                  <ma14:wrappingTextBoxFlag xmlns:ma14="http://schemas.microsoft.com/office/mac/drawingml/2011/main" xmlns:a14="http://schemas.microsoft.com/office/drawing/2010/main" xmlns:m="http://schemas.openxmlformats.org/officeDocument/2006/math" xmlns="" val="1"/>
                 </a:ext>
               </a:extLst>
             </p:spPr>
@@ -6163,9 +6617,35 @@
                 </a:lvl1pPr>
               </a:lstStyle>
               <a:p>
-                <a:r>
-                  <a:t>[a preencher]</a:t>
-                </a:r>
+                <a:pPr marL="514350" indent="-514350">
+                  <a:buFont typeface="+mj-lt"/>
+                  <a:buAutoNum type="arabicPeriod"/>
+                </a:pPr>
+                <a:r>
+                  <a:rPr lang="pt-BR" dirty="0" smtClean="0"/>
+                  <a:t>APIs</a:t>
+                </a:r>
+              </a:p>
+              <a:p>
+                <a:pPr marL="514350" indent="-514350">
+                  <a:buFont typeface="+mj-lt"/>
+                  <a:buAutoNum type="arabicPeriod"/>
+                </a:pPr>
+                <a:r>
+                  <a:rPr lang="pt-BR" dirty="0" smtClean="0"/>
+                  <a:t>Backend</a:t>
+                </a:r>
+              </a:p>
+              <a:p>
+                <a:pPr marL="514350" indent="-514350">
+                  <a:buFont typeface="+mj-lt"/>
+                  <a:buAutoNum type="arabicPeriod"/>
+                </a:pPr>
+                <a:r>
+                  <a:rPr lang="pt-BR" dirty="0" smtClean="0"/>
+                  <a:t>Mobile</a:t>
+                </a:r>
+                <a:endParaRPr dirty="0"/>
               </a:p>
             </p:txBody>
           </p:sp>
@@ -6178,10 +6658,10 @@
           </p:nvGrpSpPr>
           <p:grpSpPr>
             <a:xfrm>
-              <a:off x="0" y="6749650"/>
-              <a:ext cx="14846076" cy="6813399"/>
-              <a:chOff x="0" y="0"/>
-              <a:chExt cx="14846075" cy="6813398"/>
+              <a:off x="0" y="6278266"/>
+              <a:ext cx="14846078" cy="7284785"/>
+              <a:chOff x="0" y="-471384"/>
+              <a:chExt cx="14846077" cy="7284784"/>
             </a:xfrm>
           </p:grpSpPr>
           <p:grpSp>
@@ -6193,9 +6673,9 @@
             <p:grpSpPr>
               <a:xfrm>
                 <a:off x="0" y="0"/>
-                <a:ext cx="14846076" cy="6813399"/>
+                <a:ext cx="14846077" cy="6813400"/>
                 <a:chOff x="0" y="0"/>
-                <a:chExt cx="14846075" cy="6813398"/>
+                <a:chExt cx="14846076" cy="6813399"/>
               </a:xfrm>
             </p:grpSpPr>
             <p:sp>
@@ -6298,7 +6778,7 @@
                 <a:effectLst/>
                 <a:extLst>
                   <a:ext uri="{C572A759-6A51-4108-AA02-DFA0A04FC94B}">
-                    <ma14:wrappingTextBoxFlag xmlns="" xmlns:m="http://schemas.openxmlformats.org/officeDocument/2006/math" xmlns:a14="http://schemas.microsoft.com/office/drawing/2010/main" xmlns:ma14="http://schemas.microsoft.com/office/mac/drawingml/2011/main" val="1"/>
+                    <ma14:wrappingTextBoxFlag xmlns:ma14="http://schemas.microsoft.com/office/mac/drawingml/2011/main" xmlns:a14="http://schemas.microsoft.com/office/drawing/2010/main" xmlns:m="http://schemas.openxmlformats.org/officeDocument/2006/math" xmlns="" val="1"/>
                   </a:ext>
                 </a:extLst>
               </p:spPr>
@@ -6321,6 +6801,7 @@
                 </a:lstStyle>
                 <a:p>
                   <a:r>
+                    <a:rPr dirty="0"/>
                     <a:t>Requirements</a:t>
                   </a:r>
                 </a:p>
@@ -6335,8 +6816,8 @@
             </p:nvSpPr>
             <p:spPr>
               <a:xfrm>
-                <a:off x="345817" y="1984299"/>
-                <a:ext cx="11130600" cy="1"/>
+                <a:off x="429702" y="-471384"/>
+                <a:ext cx="13748897" cy="6701239"/>
               </a:xfrm>
               <a:custGeom>
                 <a:avLst/>
@@ -6383,12 +6864,12 @@
               <a:effectLst/>
               <a:extLst>
                 <a:ext uri="{C572A759-6A51-4108-AA02-DFA0A04FC94B}">
-                  <ma14:wrappingTextBoxFlag xmlns="" xmlns:m="http://schemas.openxmlformats.org/officeDocument/2006/math" xmlns:a14="http://schemas.microsoft.com/office/drawing/2010/main" xmlns:ma14="http://schemas.microsoft.com/office/mac/drawingml/2011/main" val="1"/>
+                  <ma14:wrappingTextBoxFlag xmlns:ma14="http://schemas.microsoft.com/office/mac/drawingml/2011/main" xmlns:a14="http://schemas.microsoft.com/office/drawing/2010/main" xmlns:m="http://schemas.openxmlformats.org/officeDocument/2006/math" xmlns="" val="1"/>
                 </a:ext>
               </a:extLst>
             </p:spPr>
             <p:txBody>
-              <a:bodyPr wrap="square" lIns="26376" tIns="26376" rIns="26376" bIns="26376" numCol="1" anchor="ctr">
+              <a:bodyPr wrap="square" lIns="26376" tIns="26376" rIns="26376" bIns="26376" numCol="2" anchor="ctr">
                 <a:spAutoFit/>
               </a:bodyPr>
               <a:lstStyle>
@@ -6405,9 +6886,397 @@
                 </a:lvl1pPr>
               </a:lstStyle>
               <a:p>
-                <a:r>
-                  <a:t>[a preencher]</a:t>
-                </a:r>
+                <a:pPr algn="just"/>
+                <a:endParaRPr lang="pt-BR" sz="1800" dirty="0" smtClean="0"/>
+              </a:p>
+              <a:p>
+                <a:pPr algn="just"/>
+                <a:endParaRPr lang="pt-BR" sz="1800" dirty="0"/>
+              </a:p>
+              <a:p>
+                <a:pPr algn="just"/>
+                <a:endParaRPr lang="pt-BR" sz="1800" dirty="0" smtClean="0"/>
+              </a:p>
+              <a:p>
+                <a:pPr algn="just"/>
+                <a:endParaRPr lang="pt-BR" sz="1800" dirty="0"/>
+              </a:p>
+              <a:p>
+                <a:pPr algn="just"/>
+                <a:endParaRPr lang="pt-BR" sz="1800" dirty="0" smtClean="0"/>
+              </a:p>
+              <a:p>
+                <a:pPr algn="just"/>
+                <a:endParaRPr lang="pt-BR" sz="1800" dirty="0"/>
+              </a:p>
+              <a:p>
+                <a:pPr algn="just"/>
+                <a:r>
+                  <a:rPr lang="pt-BR" sz="1800" b="1" dirty="0" smtClean="0"/>
+                  <a:t>Funcionalidades </a:t>
+                </a:r>
+                <a:r>
+                  <a:rPr lang="pt-BR" sz="1800" b="1" dirty="0"/>
+                  <a:t>Principais</a:t>
+                </a:r>
+                <a:r>
+                  <a:rPr lang="pt-BR" sz="1800" b="1" dirty="0" smtClean="0"/>
+                  <a:t>:</a:t>
+                </a:r>
+              </a:p>
+              <a:p>
+                <a:pPr algn="just"/>
+                <a:endParaRPr lang="pt-BR" sz="1800" b="1" dirty="0"/>
+              </a:p>
+              <a:p>
+                <a:pPr marL="285750" indent="-285750" algn="just">
+                  <a:buFont typeface="Arial" panose="020B0604020202020204" pitchFamily="34" charset="0"/>
+                  <a:buChar char="•"/>
+                </a:pPr>
+                <a:r>
+                  <a:rPr lang="pt-BR" sz="1800" dirty="0" smtClean="0"/>
+                  <a:t>Registro </a:t>
+                </a:r>
+                <a:r>
+                  <a:rPr lang="pt-BR" sz="1800" dirty="0"/>
+                  <a:t>e categorização de despesas e receitas</a:t>
+                </a:r>
+                <a:r>
+                  <a:rPr lang="pt-BR" sz="1800" dirty="0" smtClean="0"/>
+                  <a:t>.</a:t>
+                </a:r>
+              </a:p>
+              <a:p>
+                <a:pPr marL="285750" indent="-285750" algn="just">
+                  <a:buFont typeface="Arial" panose="020B0604020202020204" pitchFamily="34" charset="0"/>
+                  <a:buChar char="•"/>
+                </a:pPr>
+                <a:r>
+                  <a:rPr lang="pt-BR" sz="1800" dirty="0" smtClean="0"/>
+                  <a:t>Criação </a:t>
+                </a:r>
+                <a:r>
+                  <a:rPr lang="pt-BR" sz="1800" dirty="0"/>
+                  <a:t>e acompanhamento de orçamentos mensais</a:t>
+                </a:r>
+                <a:r>
+                  <a:rPr lang="pt-BR" sz="1800" dirty="0" smtClean="0"/>
+                  <a:t>.</a:t>
+                </a:r>
+              </a:p>
+              <a:p>
+                <a:pPr marL="285750" indent="-285750" algn="just">
+                  <a:buFont typeface="Arial" panose="020B0604020202020204" pitchFamily="34" charset="0"/>
+                  <a:buChar char="•"/>
+                </a:pPr>
+                <a:r>
+                  <a:rPr lang="pt-BR" sz="1800" dirty="0" smtClean="0"/>
+                  <a:t>Definição </a:t>
+                </a:r>
+                <a:r>
+                  <a:rPr lang="pt-BR" sz="1800" dirty="0"/>
+                  <a:t>e monitoramento de metas financeiras</a:t>
+                </a:r>
+                <a:r>
+                  <a:rPr lang="pt-BR" sz="1800" dirty="0" smtClean="0"/>
+                  <a:t>.</a:t>
+                </a:r>
+              </a:p>
+              <a:p>
+                <a:pPr marL="285750" indent="-285750" algn="just">
+                  <a:buFont typeface="Arial" panose="020B0604020202020204" pitchFamily="34" charset="0"/>
+                  <a:buChar char="•"/>
+                </a:pPr>
+                <a:r>
+                  <a:rPr lang="pt-BR" sz="1800" dirty="0" smtClean="0"/>
+                  <a:t>Geração </a:t>
+                </a:r>
+                <a:r>
+                  <a:rPr lang="pt-BR" sz="1800" dirty="0"/>
+                  <a:t>de relatórios analíticos e gráficos</a:t>
+                </a:r>
+                <a:r>
+                  <a:rPr lang="pt-BR" sz="1800" dirty="0" smtClean="0"/>
+                  <a:t>.</a:t>
+                </a:r>
+              </a:p>
+              <a:p>
+                <a:pPr algn="just"/>
+                <a:endParaRPr lang="pt-BR" sz="1800" dirty="0"/>
+              </a:p>
+              <a:p>
+                <a:pPr algn="just"/>
+                <a:r>
+                  <a:rPr lang="pt-BR" sz="1800" b="1" dirty="0" smtClean="0"/>
+                  <a:t>Não </a:t>
+                </a:r>
+                <a:r>
+                  <a:rPr lang="pt-BR" sz="1800" b="1" dirty="0"/>
+                  <a:t>Funcionais</a:t>
+                </a:r>
+                <a:r>
+                  <a:rPr lang="pt-BR" sz="1800" b="1" dirty="0" smtClean="0"/>
+                  <a:t>:</a:t>
+                </a:r>
+              </a:p>
+              <a:p>
+                <a:pPr algn="just"/>
+                <a:endParaRPr lang="pt-BR" sz="1800" b="1" dirty="0"/>
+              </a:p>
+              <a:p>
+                <a:pPr marL="285750" indent="-285750" algn="just">
+                  <a:buFont typeface="Arial" panose="020B0604020202020204" pitchFamily="34" charset="0"/>
+                  <a:buChar char="•"/>
+                </a:pPr>
+                <a:r>
+                  <a:rPr lang="pt-BR" sz="1800" b="1" dirty="0" smtClean="0"/>
+                  <a:t>Performance: </a:t>
+                </a:r>
+                <a:r>
+                  <a:rPr lang="pt-BR" sz="1800" dirty="0" smtClean="0"/>
+                  <a:t>Tempo </a:t>
+                </a:r>
+                <a:r>
+                  <a:rPr lang="pt-BR" sz="1800" dirty="0"/>
+                  <a:t>de resposta, </a:t>
+                </a:r>
+                <a:r>
+                  <a:rPr lang="pt-BR" sz="1800" dirty="0" smtClean="0"/>
+                  <a:t>escalabilidade.</a:t>
+                </a:r>
+                <a:endParaRPr lang="pt-BR" sz="1800" dirty="0"/>
+              </a:p>
+              <a:p>
+                <a:pPr marL="285750" indent="-285750" algn="just">
+                  <a:buFont typeface="Arial" panose="020B0604020202020204" pitchFamily="34" charset="0"/>
+                  <a:buChar char="•"/>
+                </a:pPr>
+                <a:r>
+                  <a:rPr lang="pt-BR" sz="1800" b="1" dirty="0" smtClean="0"/>
+                  <a:t>Acessibilidade: </a:t>
+                </a:r>
+                <a:r>
+                  <a:rPr lang="pt-BR" sz="1800" dirty="0" smtClean="0"/>
+                  <a:t>Compatibilidade </a:t>
+                </a:r>
+                <a:r>
+                  <a:rPr lang="pt-BR" sz="1800" dirty="0"/>
+                  <a:t>com dispositivos assistivos</a:t>
+                </a:r>
+                <a:r>
+                  <a:rPr lang="pt-BR" sz="1800" dirty="0" smtClean="0"/>
+                  <a:t>).</a:t>
+                </a:r>
+              </a:p>
+              <a:p>
+                <a:pPr marL="285750" indent="-285750" algn="just">
+                  <a:buFont typeface="Arial" panose="020B0604020202020204" pitchFamily="34" charset="0"/>
+                  <a:buChar char="•"/>
+                </a:pPr>
+                <a:r>
+                  <a:rPr lang="pt-BR" sz="1800" b="1" dirty="0"/>
+                  <a:t>Escalabilidade: </a:t>
+                </a:r>
+                <a:r>
+                  <a:rPr lang="pt-BR" sz="1800" dirty="0"/>
+                  <a:t>O sistema deve ser capaz de lidar com um número crescente de usuários sem perda de performance</a:t>
+                </a:r>
+                <a:r>
+                  <a:rPr lang="pt-BR" sz="1800" dirty="0" smtClean="0"/>
+                  <a:t>.</a:t>
+                </a:r>
+              </a:p>
+              <a:p>
+                <a:pPr marL="285750" indent="-285750" algn="just">
+                  <a:buFont typeface="Arial" panose="020B0604020202020204" pitchFamily="34" charset="0"/>
+                  <a:buChar char="•"/>
+                </a:pPr>
+                <a:r>
+                  <a:rPr lang="pt-BR" sz="1800" b="1" dirty="0" smtClean="0"/>
+                  <a:t>Compatibilidade: </a:t>
+                </a:r>
+                <a:r>
+                  <a:rPr lang="pt-BR" sz="1800" dirty="0"/>
+                  <a:t>O aplicativo deve ser acessível tanto em dispositivos móveis quanto em desktop</a:t>
+                </a:r>
+                <a:r>
+                  <a:rPr lang="pt-BR" sz="1800" dirty="0" smtClean="0"/>
+                  <a:t>.</a:t>
+                </a:r>
+              </a:p>
+              <a:p>
+                <a:pPr marL="285750" indent="-285750" algn="just">
+                  <a:buFont typeface="Arial" panose="020B0604020202020204" pitchFamily="34" charset="0"/>
+                  <a:buChar char="•"/>
+                </a:pPr>
+                <a:r>
+                  <a:rPr lang="pt-BR" sz="1800" b="1" dirty="0" smtClean="0"/>
+                  <a:t>Manutenção: </a:t>
+                </a:r>
+                <a:r>
+                  <a:rPr lang="pt-BR" sz="1800" dirty="0"/>
+                  <a:t>Estabelecer um plano de </a:t>
+                </a:r>
+                <a:r>
+                  <a:rPr lang="pt-BR" sz="1800" dirty="0" smtClean="0"/>
+                  <a:t>manutenção.</a:t>
+                </a:r>
+              </a:p>
+              <a:p>
+                <a:pPr marL="285750" indent="-285750" algn="just">
+                  <a:buFont typeface="Arial" panose="020B0604020202020204" pitchFamily="34" charset="0"/>
+                  <a:buChar char="•"/>
+                </a:pPr>
+                <a:endParaRPr lang="pt-BR" sz="1800" dirty="0"/>
+              </a:p>
+              <a:p>
+                <a:pPr marL="285750" indent="-285750" algn="just">
+                  <a:buFont typeface="Arial" panose="020B0604020202020204" pitchFamily="34" charset="0"/>
+                  <a:buChar char="•"/>
+                </a:pPr>
+                <a:endParaRPr lang="pt-BR" sz="1800" dirty="0" smtClean="0"/>
+              </a:p>
+              <a:p>
+                <a:pPr marL="285750" indent="-285750" algn="just">
+                  <a:buFont typeface="Arial" panose="020B0604020202020204" pitchFamily="34" charset="0"/>
+                  <a:buChar char="•"/>
+                </a:pPr>
+                <a:endParaRPr lang="pt-BR" sz="1800" dirty="0"/>
+              </a:p>
+              <a:p>
+                <a:pPr marL="285750" indent="-285750" algn="just">
+                  <a:buFont typeface="Arial" panose="020B0604020202020204" pitchFamily="34" charset="0"/>
+                  <a:buChar char="•"/>
+                </a:pPr>
+                <a:endParaRPr lang="pt-BR" sz="1800" dirty="0" smtClean="0"/>
+              </a:p>
+              <a:p>
+                <a:pPr marL="285750" indent="-285750" algn="just">
+                  <a:buFont typeface="Arial" panose="020B0604020202020204" pitchFamily="34" charset="0"/>
+                  <a:buChar char="•"/>
+                </a:pPr>
+                <a:endParaRPr lang="pt-BR" sz="1800" dirty="0"/>
+              </a:p>
+              <a:p>
+                <a:pPr marL="285750" indent="-285750" algn="just">
+                  <a:buFont typeface="Arial" panose="020B0604020202020204" pitchFamily="34" charset="0"/>
+                  <a:buChar char="•"/>
+                </a:pPr>
+                <a:endParaRPr lang="pt-BR" sz="1800" dirty="0" smtClean="0"/>
+              </a:p>
+              <a:p>
+                <a:pPr algn="just"/>
+                <a:endParaRPr lang="pt-BR" sz="1800" dirty="0" smtClean="0"/>
+              </a:p>
+              <a:p>
+                <a:pPr algn="just"/>
+                <a:endParaRPr lang="pt-BR" sz="1800" dirty="0"/>
+              </a:p>
+              <a:p>
+                <a:pPr algn="just"/>
+                <a:r>
+                  <a:rPr lang="pt-BR" sz="1800" b="1" dirty="0" smtClean="0"/>
+                  <a:t>Requisitos </a:t>
+                </a:r>
+                <a:r>
+                  <a:rPr lang="pt-BR" sz="1800" b="1" dirty="0"/>
+                  <a:t>Técnicos</a:t>
+                </a:r>
+                <a:r>
+                  <a:rPr lang="pt-BR" sz="1800" b="1" dirty="0" smtClean="0"/>
+                  <a:t>:</a:t>
+                </a:r>
+              </a:p>
+              <a:p>
+                <a:pPr algn="just"/>
+                <a:endParaRPr lang="pt-BR" sz="1800" b="1" dirty="0" smtClean="0"/>
+              </a:p>
+              <a:p>
+                <a:pPr marL="285750" indent="-285750" algn="just">
+                  <a:buFont typeface="Arial" panose="020B0604020202020204" pitchFamily="34" charset="0"/>
+                  <a:buChar char="•"/>
+                </a:pPr>
+                <a:r>
+                  <a:rPr lang="pt-BR" sz="1800" dirty="0" smtClean="0"/>
+                  <a:t>Compatibilidade </a:t>
+                </a:r>
+                <a:r>
+                  <a:rPr lang="pt-BR" sz="1800" dirty="0"/>
+                  <a:t>com diferentes versões de sistemas operacionais</a:t>
+                </a:r>
+                <a:r>
+                  <a:rPr lang="pt-BR" sz="1800" dirty="0" smtClean="0"/>
+                  <a:t>.</a:t>
+                </a:r>
+              </a:p>
+              <a:p>
+                <a:pPr marL="285750" indent="-285750" algn="just">
+                  <a:buFont typeface="Arial" panose="020B0604020202020204" pitchFamily="34" charset="0"/>
+                  <a:buChar char="•"/>
+                </a:pPr>
+                <a:r>
+                  <a:rPr lang="pt-BR" sz="1800" dirty="0" smtClean="0"/>
+                  <a:t>Integrações </a:t>
+                </a:r>
+                <a:r>
+                  <a:rPr lang="pt-BR" sz="1800" dirty="0"/>
+                  <a:t>com serviços </a:t>
+                </a:r>
+                <a:r>
+                  <a:rPr lang="pt-BR" sz="1800" dirty="0" smtClean="0"/>
+                  <a:t>externos.</a:t>
+                </a:r>
+              </a:p>
+              <a:p>
+                <a:pPr marL="285750" indent="-285750" algn="just">
+                  <a:buFont typeface="Arial" panose="020B0604020202020204" pitchFamily="34" charset="0"/>
+                  <a:buChar char="•"/>
+                </a:pPr>
+                <a:r>
+                  <a:rPr lang="pt-BR" sz="1800" dirty="0" smtClean="0"/>
+                  <a:t>Funcionalidade offline.</a:t>
+                </a:r>
+              </a:p>
+              <a:p>
+                <a:pPr marL="285750" indent="-285750" algn="just">
+                  <a:buFont typeface="Arial" panose="020B0604020202020204" pitchFamily="34" charset="0"/>
+                  <a:buChar char="•"/>
+                </a:pPr>
+                <a:r>
+                  <a:rPr lang="pt-BR" sz="1800" b="1" dirty="0"/>
+                  <a:t>Sistema de Autenticação</a:t>
+                </a:r>
+                <a:r>
+                  <a:rPr lang="pt-BR" sz="1800" dirty="0"/>
+                  <a:t>: Implementar autenticação segura, </a:t>
+                </a:r>
+                <a:r>
+                  <a:rPr lang="pt-BR" sz="1800" dirty="0" smtClean="0"/>
+                  <a:t>como biometria </a:t>
+                </a:r>
+                <a:r>
+                  <a:rPr lang="pt-BR" sz="1800" dirty="0"/>
+                  <a:t>(impressão digital ou reconhecimento facial</a:t>
+                </a:r>
+                <a:r>
+                  <a:rPr lang="pt-BR" sz="1800" dirty="0" smtClean="0"/>
+                  <a:t>).</a:t>
+                </a:r>
+              </a:p>
+              <a:p>
+                <a:pPr marL="285750" indent="-285750" algn="just">
+                  <a:buFont typeface="Arial" panose="020B0604020202020204" pitchFamily="34" charset="0"/>
+                  <a:buChar char="•"/>
+                </a:pPr>
+                <a:r>
+                  <a:rPr lang="pt-BR" sz="1800" b="1" dirty="0"/>
+                  <a:t>Notificações Push</a:t>
+                </a:r>
+                <a:r>
+                  <a:rPr lang="pt-BR" sz="1800" dirty="0"/>
+                  <a:t>: Implementar notificações push para alertas sobre vencimentos, lembretes e dicas financeiras.</a:t>
+                </a:r>
+                <a:endParaRPr sz="1800" dirty="0"/>
               </a:p>
             </p:txBody>
           </p:sp>
@@ -6420,10 +7289,10 @@
           </p:nvGrpSpPr>
           <p:grpSpPr>
             <a:xfrm>
-              <a:off x="14923574" y="19594"/>
-              <a:ext cx="9293743" cy="6648909"/>
-              <a:chOff x="0" y="0"/>
-              <a:chExt cx="9293742" cy="6648908"/>
+              <a:off x="14923574" y="19595"/>
+              <a:ext cx="9293745" cy="4438562"/>
+              <a:chOff x="0" y="1"/>
+              <a:chExt cx="9293744" cy="4438561"/>
             </a:xfrm>
           </p:grpSpPr>
           <p:grpSp>
@@ -6434,10 +7303,10 @@
             </p:nvGrpSpPr>
             <p:grpSpPr>
               <a:xfrm>
-                <a:off x="0" y="0"/>
-                <a:ext cx="9293743" cy="6648909"/>
-                <a:chOff x="0" y="0"/>
-                <a:chExt cx="9293742" cy="6648908"/>
+                <a:off x="0" y="1"/>
+                <a:ext cx="9293744" cy="4438561"/>
+                <a:chOff x="0" y="1"/>
+                <a:chExt cx="9293743" cy="4438560"/>
               </a:xfrm>
             </p:grpSpPr>
             <p:sp>
@@ -6448,8 +7317,8 @@
               </p:nvSpPr>
               <p:spPr>
                 <a:xfrm>
-                  <a:off x="0" y="0"/>
-                  <a:ext cx="9293743" cy="6648909"/>
+                  <a:off x="0" y="1"/>
+                  <a:ext cx="9293743" cy="4438560"/>
                 </a:xfrm>
                 <a:prstGeom prst="rect">
                   <a:avLst/>
@@ -6506,7 +7375,7 @@
                 <a:effectLst/>
                 <a:extLst>
                   <a:ext uri="{C572A759-6A51-4108-AA02-DFA0A04FC94B}">
-                    <ma14:wrappingTextBoxFlag xmlns="" xmlns:m="http://schemas.openxmlformats.org/officeDocument/2006/math" xmlns:a14="http://schemas.microsoft.com/office/drawing/2010/main" xmlns:ma14="http://schemas.microsoft.com/office/mac/drawingml/2011/main" val="1"/>
+                    <ma14:wrappingTextBoxFlag xmlns:ma14="http://schemas.microsoft.com/office/mac/drawingml/2011/main" xmlns:a14="http://schemas.microsoft.com/office/drawing/2010/main" xmlns:m="http://schemas.openxmlformats.org/officeDocument/2006/math" xmlns="" val="1"/>
                   </a:ext>
                 </a:extLst>
               </p:spPr>
@@ -6529,6 +7398,7 @@
                 </a:lstStyle>
                 <a:p>
                   <a:r>
+                    <a:rPr dirty="0"/>
                     <a:t>Prototype Test Strategy</a:t>
                   </a:r>
                 </a:p>
@@ -6543,8 +7413,8 @@
             </p:nvSpPr>
             <p:spPr>
               <a:xfrm>
-                <a:off x="333917" y="1952821"/>
-                <a:ext cx="8680777" cy="535355"/>
+                <a:off x="306483" y="960716"/>
+                <a:ext cx="8680777" cy="3100254"/>
               </a:xfrm>
               <a:prstGeom prst="rect">
                 <a:avLst/>
@@ -6557,7 +7427,7 @@
               <a:effectLst/>
               <a:extLst>
                 <a:ext uri="{C572A759-6A51-4108-AA02-DFA0A04FC94B}">
-                  <ma14:wrappingTextBoxFlag xmlns="" xmlns:m="http://schemas.openxmlformats.org/officeDocument/2006/math" xmlns:a14="http://schemas.microsoft.com/office/drawing/2010/main" xmlns:ma14="http://schemas.microsoft.com/office/mac/drawingml/2011/main" val="1"/>
+                  <ma14:wrappingTextBoxFlag xmlns:ma14="http://schemas.microsoft.com/office/mac/drawingml/2011/main" xmlns:a14="http://schemas.microsoft.com/office/drawing/2010/main" xmlns:m="http://schemas.openxmlformats.org/officeDocument/2006/math" xmlns="" val="1"/>
                 </a:ext>
               </a:extLst>
             </p:spPr>
@@ -6579,9 +7449,98 @@
                 </a:lvl1pPr>
               </a:lstStyle>
               <a:p>
-                <a:r>
-                  <a:t>[a preencher]</a:t>
-                </a:r>
+                <a:pPr marL="342900" indent="-342900" algn="just">
+                  <a:buFont typeface="+mj-lt"/>
+                  <a:buAutoNum type="arabicPeriod"/>
+                </a:pPr>
+                <a:r>
+                  <a:rPr lang="pt-BR" sz="1800" b="1" dirty="0"/>
+                  <a:t>Testes de Usabilidade</a:t>
+                </a:r>
+                <a:r>
+                  <a:rPr lang="pt-BR" sz="1800" dirty="0"/>
+                  <a:t>: Conduzir sessões de testes com usuários para observar a interação e a experiência com o protótipo</a:t>
+                </a:r>
+                <a:r>
+                  <a:rPr lang="pt-BR" sz="1800" dirty="0" smtClean="0"/>
+                  <a:t>.</a:t>
+                </a:r>
+              </a:p>
+              <a:p>
+                <a:pPr marL="342900" indent="-342900" algn="just">
+                  <a:buFont typeface="+mj-lt"/>
+                  <a:buAutoNum type="arabicPeriod"/>
+                </a:pPr>
+                <a:endParaRPr lang="pt-BR" sz="1800" dirty="0"/>
+              </a:p>
+              <a:p>
+                <a:pPr marL="342900" indent="-342900" algn="just">
+                  <a:buFont typeface="+mj-lt"/>
+                  <a:buAutoNum type="arabicPeriod"/>
+                </a:pPr>
+                <a:r>
+                  <a:rPr lang="pt-BR" sz="1800" b="1" dirty="0"/>
+                  <a:t>Feedback Contínuo</a:t>
+                </a:r>
+                <a:r>
+                  <a:rPr lang="pt-BR" sz="1800" dirty="0"/>
+                  <a:t>: Implementar formas de coleta de feedback direto no aplicativo (ex: pesquisas, comentários</a:t>
+                </a:r>
+                <a:r>
+                  <a:rPr lang="pt-BR" sz="1800" dirty="0" smtClean="0"/>
+                  <a:t>).</a:t>
+                </a:r>
+              </a:p>
+              <a:p>
+                <a:pPr marL="342900" indent="-342900" algn="just">
+                  <a:buFont typeface="+mj-lt"/>
+                  <a:buAutoNum type="arabicPeriod"/>
+                </a:pPr>
+                <a:endParaRPr lang="pt-BR" sz="1800" dirty="0"/>
+              </a:p>
+              <a:p>
+                <a:pPr marL="342900" indent="-342900" algn="just">
+                  <a:buFont typeface="+mj-lt"/>
+                  <a:buAutoNum type="arabicPeriod"/>
+                </a:pPr>
+                <a:r>
+                  <a:rPr lang="pt-BR" sz="1800" b="1" dirty="0" smtClean="0"/>
+                  <a:t>Cenários </a:t>
+                </a:r>
+                <a:r>
+                  <a:rPr lang="pt-BR" sz="1800" b="1" dirty="0"/>
+                  <a:t>de Uso</a:t>
+                </a:r>
+                <a:r>
+                  <a:rPr lang="pt-BR" sz="1800" dirty="0"/>
+                  <a:t>: Criar cenários de uso para testar fluxos críticos como criação de orçamento e geração de relatórios</a:t>
+                </a:r>
+                <a:r>
+                  <a:rPr lang="pt-BR" sz="1800" dirty="0" smtClean="0"/>
+                  <a:t>.</a:t>
+                </a:r>
+              </a:p>
+              <a:p>
+                <a:pPr marL="342900" indent="-342900" algn="just">
+                  <a:buFont typeface="+mj-lt"/>
+                  <a:buAutoNum type="arabicPeriod"/>
+                </a:pPr>
+                <a:endParaRPr lang="pt-BR" sz="1800" dirty="0"/>
+              </a:p>
+              <a:p>
+                <a:pPr marL="342900" indent="-342900" algn="just">
+                  <a:buFont typeface="+mj-lt"/>
+                  <a:buAutoNum type="arabicPeriod"/>
+                </a:pPr>
+                <a:r>
+                  <a:rPr lang="pt-BR" sz="1800" b="1" dirty="0"/>
+                  <a:t>Teste de Desempenho</a:t>
+                </a:r>
+                <a:r>
+                  <a:rPr lang="pt-BR" sz="1800" dirty="0"/>
+                  <a:t>: Avaliar a rapidez e a eficiência do aplicativo sob diferentes condições de carga.</a:t>
+                </a:r>
+                <a:endParaRPr sz="1800" dirty="0"/>
               </a:p>
             </p:txBody>
           </p:sp>
@@ -6721,7 +7680,7 @@
                 <a:effectLst/>
                 <a:extLst>
                   <a:ext uri="{C572A759-6A51-4108-AA02-DFA0A04FC94B}">
-                    <ma14:wrappingTextBoxFlag xmlns="" xmlns:m="http://schemas.openxmlformats.org/officeDocument/2006/math" xmlns:a14="http://schemas.microsoft.com/office/drawing/2010/main" xmlns:ma14="http://schemas.microsoft.com/office/mac/drawingml/2011/main" val="1"/>
+                    <ma14:wrappingTextBoxFlag xmlns:ma14="http://schemas.microsoft.com/office/mac/drawingml/2011/main" xmlns:a14="http://schemas.microsoft.com/office/drawing/2010/main" xmlns:m="http://schemas.openxmlformats.org/officeDocument/2006/math" xmlns="" val="1"/>
                   </a:ext>
                 </a:extLst>
               </p:spPr>
@@ -6744,6 +7703,7 @@
                 </a:lstStyle>
                 <a:p>
                   <a:r>
+                    <a:rPr dirty="0"/>
                     <a:t>Indicators</a:t>
                   </a:r>
                 </a:p>
@@ -6772,7 +7732,7 @@
               <a:effectLst/>
               <a:extLst>
                 <a:ext uri="{C572A759-6A51-4108-AA02-DFA0A04FC94B}">
-                  <ma14:wrappingTextBoxFlag xmlns="" xmlns:m="http://schemas.openxmlformats.org/officeDocument/2006/math" xmlns:a14="http://schemas.microsoft.com/office/drawing/2010/main" xmlns:ma14="http://schemas.microsoft.com/office/mac/drawingml/2011/main" val="1"/>
+                  <ma14:wrappingTextBoxFlag xmlns:ma14="http://schemas.microsoft.com/office/mac/drawingml/2011/main" xmlns:a14="http://schemas.microsoft.com/office/drawing/2010/main" xmlns:m="http://schemas.openxmlformats.org/officeDocument/2006/math" xmlns="" val="1"/>
                 </a:ext>
               </a:extLst>
             </p:spPr>
@@ -6895,7 +7855,7 @@
                 <a:effectLst/>
                 <a:extLst>
                   <a:ext uri="{C572A759-6A51-4108-AA02-DFA0A04FC94B}">
-                    <ma14:wrappingTextBoxFlag xmlns="" xmlns:m="http://schemas.openxmlformats.org/officeDocument/2006/math" xmlns:a14="http://schemas.microsoft.com/office/drawing/2010/main" xmlns:ma14="http://schemas.microsoft.com/office/mac/drawingml/2011/main" val="1"/>
+                    <ma14:wrappingTextBoxFlag xmlns:ma14="http://schemas.microsoft.com/office/mac/drawingml/2011/main" xmlns:a14="http://schemas.microsoft.com/office/drawing/2010/main" xmlns:m="http://schemas.openxmlformats.org/officeDocument/2006/math" xmlns="" val="1"/>
                   </a:ext>
                 </a:extLst>
               </p:spPr>
@@ -6918,6 +7878,7 @@
                 </a:lstStyle>
                 <a:p>
                   <a:r>
+                    <a:rPr dirty="0"/>
                     <a:t>Refinement Strategy</a:t>
                   </a:r>
                 </a:p>
@@ -6946,7 +7907,7 @@
               <a:effectLst/>
               <a:extLst>
                 <a:ext uri="{C572A759-6A51-4108-AA02-DFA0A04FC94B}">
-                  <ma14:wrappingTextBoxFlag xmlns="" xmlns:m="http://schemas.openxmlformats.org/officeDocument/2006/math" xmlns:a14="http://schemas.microsoft.com/office/drawing/2010/main" xmlns:ma14="http://schemas.microsoft.com/office/mac/drawingml/2011/main" val="1"/>
+                  <ma14:wrappingTextBoxFlag xmlns:ma14="http://schemas.microsoft.com/office/mac/drawingml/2011/main" xmlns:a14="http://schemas.microsoft.com/office/drawing/2010/main" xmlns:m="http://schemas.openxmlformats.org/officeDocument/2006/math" xmlns="" val="1"/>
                 </a:ext>
               </a:extLst>
             </p:spPr>
@@ -7069,7 +8030,7 @@
                 <a:effectLst/>
                 <a:extLst>
                   <a:ext uri="{C572A759-6A51-4108-AA02-DFA0A04FC94B}">
-                    <ma14:wrappingTextBoxFlag xmlns="" xmlns:m="http://schemas.openxmlformats.org/officeDocument/2006/math" xmlns:a14="http://schemas.microsoft.com/office/drawing/2010/main" xmlns:ma14="http://schemas.microsoft.com/office/mac/drawingml/2011/main" val="1"/>
+                    <ma14:wrappingTextBoxFlag xmlns:ma14="http://schemas.microsoft.com/office/mac/drawingml/2011/main" xmlns:a14="http://schemas.microsoft.com/office/drawing/2010/main" xmlns:m="http://schemas.openxmlformats.org/officeDocument/2006/math" xmlns="" val="1"/>
                   </a:ext>
                 </a:extLst>
               </p:spPr>
@@ -7092,6 +8053,7 @@
                 </a:lstStyle>
                 <a:p>
                   <a:r>
+                    <a:rPr dirty="0"/>
                     <a:t>Design Patterns</a:t>
                   </a:r>
                 </a:p>
@@ -7120,7 +8082,7 @@
               <a:effectLst/>
               <a:extLst>
                 <a:ext uri="{C572A759-6A51-4108-AA02-DFA0A04FC94B}">
-                  <ma14:wrappingTextBoxFlag xmlns="" xmlns:m="http://schemas.openxmlformats.org/officeDocument/2006/math" xmlns:a14="http://schemas.microsoft.com/office/drawing/2010/main" xmlns:ma14="http://schemas.microsoft.com/office/mac/drawingml/2011/main" val="1"/>
+                  <ma14:wrappingTextBoxFlag xmlns:ma14="http://schemas.microsoft.com/office/mac/drawingml/2011/main" xmlns:a14="http://schemas.microsoft.com/office/drawing/2010/main" xmlns:m="http://schemas.openxmlformats.org/officeDocument/2006/math" xmlns="" val="1"/>
                 </a:ext>
               </a:extLst>
             </p:spPr>
@@ -7243,7 +8205,7 @@
                 <a:effectLst/>
                 <a:extLst>
                   <a:ext uri="{C572A759-6A51-4108-AA02-DFA0A04FC94B}">
-                    <ma14:wrappingTextBoxFlag xmlns="" xmlns:m="http://schemas.openxmlformats.org/officeDocument/2006/math" xmlns:a14="http://schemas.microsoft.com/office/drawing/2010/main" xmlns:ma14="http://schemas.microsoft.com/office/mac/drawingml/2011/main" val="1"/>
+                    <ma14:wrappingTextBoxFlag xmlns:ma14="http://schemas.microsoft.com/office/mac/drawingml/2011/main" xmlns:a14="http://schemas.microsoft.com/office/drawing/2010/main" xmlns:m="http://schemas.openxmlformats.org/officeDocument/2006/math" xmlns="" val="1"/>
                   </a:ext>
                 </a:extLst>
               </p:spPr>
@@ -7266,6 +8228,7 @@
                 </a:lstStyle>
                 <a:p>
                   <a:r>
+                    <a:rPr dirty="0"/>
                     <a:t>Development rules</a:t>
                   </a:r>
                 </a:p>
@@ -7294,7 +8257,7 @@
               <a:effectLst/>
               <a:extLst>
                 <a:ext uri="{C572A759-6A51-4108-AA02-DFA0A04FC94B}">
-                  <ma14:wrappingTextBoxFlag xmlns="" xmlns:m="http://schemas.openxmlformats.org/officeDocument/2006/math" xmlns:a14="http://schemas.microsoft.com/office/drawing/2010/main" xmlns:ma14="http://schemas.microsoft.com/office/mac/drawingml/2011/main" val="1"/>
+                  <ma14:wrappingTextBoxFlag xmlns:ma14="http://schemas.microsoft.com/office/mac/drawingml/2011/main" xmlns:a14="http://schemas.microsoft.com/office/drawing/2010/main" xmlns:m="http://schemas.openxmlformats.org/officeDocument/2006/math" xmlns="" val="1"/>
                 </a:ext>
               </a:extLst>
             </p:spPr>
@@ -7417,7 +8380,7 @@
                 <a:effectLst/>
                 <a:extLst>
                   <a:ext uri="{C572A759-6A51-4108-AA02-DFA0A04FC94B}">
-                    <ma14:wrappingTextBoxFlag xmlns="" xmlns:m="http://schemas.openxmlformats.org/officeDocument/2006/math" xmlns:a14="http://schemas.microsoft.com/office/drawing/2010/main" xmlns:ma14="http://schemas.microsoft.com/office/mac/drawingml/2011/main" val="1"/>
+                    <ma14:wrappingTextBoxFlag xmlns:ma14="http://schemas.microsoft.com/office/mac/drawingml/2011/main" xmlns:a14="http://schemas.microsoft.com/office/drawing/2010/main" xmlns:m="http://schemas.openxmlformats.org/officeDocument/2006/math" xmlns="" val="1"/>
                   </a:ext>
                 </a:extLst>
               </p:spPr>
@@ -7440,6 +8403,7 @@
                 </a:lstStyle>
                 <a:p>
                   <a:r>
+                    <a:rPr dirty="0"/>
                     <a:t>Test Strategy</a:t>
                   </a:r>
                 </a:p>
@@ -7468,7 +8432,7 @@
               <a:effectLst/>
               <a:extLst>
                 <a:ext uri="{C572A759-6A51-4108-AA02-DFA0A04FC94B}">
-                  <ma14:wrappingTextBoxFlag xmlns="" xmlns:m="http://schemas.openxmlformats.org/officeDocument/2006/math" xmlns:a14="http://schemas.microsoft.com/office/drawing/2010/main" xmlns:ma14="http://schemas.microsoft.com/office/mac/drawingml/2011/main" val="1"/>
+                  <ma14:wrappingTextBoxFlag xmlns:ma14="http://schemas.microsoft.com/office/mac/drawingml/2011/main" xmlns:a14="http://schemas.microsoft.com/office/drawing/2010/main" xmlns:m="http://schemas.openxmlformats.org/officeDocument/2006/math" xmlns="" val="1"/>
                 </a:ext>
               </a:extLst>
             </p:spPr>
@@ -7583,7 +8547,7 @@
           </a:ln>
           <a:extLst>
             <a:ext uri="{C572A759-6A51-4108-AA02-DFA0A04FC94B}">
-              <ma14:wrappingTextBoxFlag xmlns="" xmlns:m="http://schemas.openxmlformats.org/officeDocument/2006/math" xmlns:a14="http://schemas.microsoft.com/office/drawing/2010/main" xmlns:ma14="http://schemas.microsoft.com/office/mac/drawingml/2011/main" val="1"/>
+              <ma14:wrappingTextBoxFlag xmlns:ma14="http://schemas.microsoft.com/office/mac/drawingml/2011/main" xmlns:a14="http://schemas.microsoft.com/office/drawing/2010/main" xmlns:m="http://schemas.openxmlformats.org/officeDocument/2006/math" xmlns="" val="1"/>
             </a:ext>
           </a:extLst>
         </p:spPr>
@@ -7674,7 +8638,7 @@
           </a:ln>
           <a:extLst>
             <a:ext uri="{C572A759-6A51-4108-AA02-DFA0A04FC94B}">
-              <ma14:wrappingTextBoxFlag xmlns="" xmlns:m="http://schemas.openxmlformats.org/officeDocument/2006/math" xmlns:a14="http://schemas.microsoft.com/office/drawing/2010/main" xmlns:ma14="http://schemas.microsoft.com/office/mac/drawingml/2011/main" val="1"/>
+              <ma14:wrappingTextBoxFlag xmlns:ma14="http://schemas.microsoft.com/office/mac/drawingml/2011/main" xmlns:a14="http://schemas.microsoft.com/office/drawing/2010/main" xmlns:m="http://schemas.openxmlformats.org/officeDocument/2006/math" xmlns="" val="1"/>
             </a:ext>
           </a:extLst>
         </p:spPr>
@@ -7805,7 +8769,7 @@
           </a:ln>
           <a:extLst>
             <a:ext uri="{C572A759-6A51-4108-AA02-DFA0A04FC94B}">
-              <ma14:wrappingTextBoxFlag xmlns="" xmlns:m="http://schemas.openxmlformats.org/officeDocument/2006/math" xmlns:a14="http://schemas.microsoft.com/office/drawing/2010/main" xmlns:ma14="http://schemas.microsoft.com/office/mac/drawingml/2011/main" val="1"/>
+              <ma14:wrappingTextBoxFlag xmlns:ma14="http://schemas.microsoft.com/office/mac/drawingml/2011/main" xmlns:a14="http://schemas.microsoft.com/office/drawing/2010/main" xmlns:m="http://schemas.openxmlformats.org/officeDocument/2006/math" xmlns="" val="1"/>
             </a:ext>
           </a:extLst>
         </p:spPr>
@@ -7856,7 +8820,7 @@
           </a:ln>
           <a:extLst>
             <a:ext uri="{C572A759-6A51-4108-AA02-DFA0A04FC94B}">
-              <ma14:wrappingTextBoxFlag xmlns="" xmlns:m="http://schemas.openxmlformats.org/officeDocument/2006/math" xmlns:a14="http://schemas.microsoft.com/office/drawing/2010/main" xmlns:ma14="http://schemas.microsoft.com/office/mac/drawingml/2011/main" val="1"/>
+              <ma14:wrappingTextBoxFlag xmlns:ma14="http://schemas.microsoft.com/office/mac/drawingml/2011/main" xmlns:a14="http://schemas.microsoft.com/office/drawing/2010/main" xmlns:m="http://schemas.openxmlformats.org/officeDocument/2006/math" xmlns="" val="1"/>
             </a:ext>
           </a:extLst>
         </p:spPr>
@@ -7903,7 +8867,7 @@
           </a:ln>
           <a:extLst>
             <a:ext uri="{C572A759-6A51-4108-AA02-DFA0A04FC94B}">
-              <ma14:wrappingTextBoxFlag xmlns="" xmlns:m="http://schemas.openxmlformats.org/officeDocument/2006/math" xmlns:a14="http://schemas.microsoft.com/office/drawing/2010/main" xmlns:ma14="http://schemas.microsoft.com/office/mac/drawingml/2011/main" val="1"/>
+              <ma14:wrappingTextBoxFlag xmlns:ma14="http://schemas.microsoft.com/office/mac/drawingml/2011/main" xmlns:a14="http://schemas.microsoft.com/office/drawing/2010/main" xmlns:m="http://schemas.openxmlformats.org/officeDocument/2006/math" xmlns="" val="1"/>
             </a:ext>
           </a:extLst>
         </p:spPr>
@@ -7950,7 +8914,7 @@
           </a:ln>
           <a:extLst>
             <a:ext uri="{C572A759-6A51-4108-AA02-DFA0A04FC94B}">
-              <ma14:wrappingTextBoxFlag xmlns="" xmlns:m="http://schemas.openxmlformats.org/officeDocument/2006/math" xmlns:a14="http://schemas.microsoft.com/office/drawing/2010/main" xmlns:ma14="http://schemas.microsoft.com/office/mac/drawingml/2011/main" val="1"/>
+              <ma14:wrappingTextBoxFlag xmlns:ma14="http://schemas.microsoft.com/office/mac/drawingml/2011/main" xmlns:a14="http://schemas.microsoft.com/office/drawing/2010/main" xmlns:m="http://schemas.openxmlformats.org/officeDocument/2006/math" xmlns="" val="1"/>
             </a:ext>
           </a:extLst>
         </p:spPr>
@@ -7973,6 +8937,7 @@
           </a:lstStyle>
           <a:p>
             <a:r>
+              <a:rPr dirty="0"/>
               <a:t>Act -  Requirements' Identification</a:t>
             </a:r>
           </a:p>
@@ -8118,7 +9083,7 @@
           </a:ln>
           <a:extLst>
             <a:ext uri="{C572A759-6A51-4108-AA02-DFA0A04FC94B}">
-              <ma14:wrappingTextBoxFlag xmlns="" xmlns:m="http://schemas.openxmlformats.org/officeDocument/2006/math" xmlns:a14="http://schemas.microsoft.com/office/drawing/2010/main" xmlns:ma14="http://schemas.microsoft.com/office/mac/drawingml/2011/main" val="1"/>
+              <ma14:wrappingTextBoxFlag xmlns:ma14="http://schemas.microsoft.com/office/mac/drawingml/2011/main" xmlns:a14="http://schemas.microsoft.com/office/drawing/2010/main" xmlns:m="http://schemas.openxmlformats.org/officeDocument/2006/math" xmlns="" val="1"/>
             </a:ext>
           </a:extLst>
         </p:spPr>
@@ -8165,7 +9130,7 @@
           </a:ln>
           <a:extLst>
             <a:ext uri="{C572A759-6A51-4108-AA02-DFA0A04FC94B}">
-              <ma14:wrappingTextBoxFlag xmlns="" xmlns:m="http://schemas.openxmlformats.org/officeDocument/2006/math" xmlns:a14="http://schemas.microsoft.com/office/drawing/2010/main" xmlns:ma14="http://schemas.microsoft.com/office/mac/drawingml/2011/main" val="1"/>
+              <ma14:wrappingTextBoxFlag xmlns:ma14="http://schemas.microsoft.com/office/mac/drawingml/2011/main" xmlns:a14="http://schemas.microsoft.com/office/drawing/2010/main" xmlns:m="http://schemas.openxmlformats.org/officeDocument/2006/math" xmlns="" val="1"/>
             </a:ext>
           </a:extLst>
         </p:spPr>
@@ -8255,7 +9220,7 @@
           </a:ln>
           <a:extLst>
             <a:ext uri="{C572A759-6A51-4108-AA02-DFA0A04FC94B}">
-              <ma14:wrappingTextBoxFlag xmlns="" xmlns:m="http://schemas.openxmlformats.org/officeDocument/2006/math" xmlns:a14="http://schemas.microsoft.com/office/drawing/2010/main" xmlns:ma14="http://schemas.microsoft.com/office/mac/drawingml/2011/main" val="1"/>
+              <ma14:wrappingTextBoxFlag xmlns:ma14="http://schemas.microsoft.com/office/mac/drawingml/2011/main" xmlns:a14="http://schemas.microsoft.com/office/drawing/2010/main" xmlns:m="http://schemas.openxmlformats.org/officeDocument/2006/math" xmlns="" val="1"/>
             </a:ext>
           </a:extLst>
         </p:spPr>
@@ -8342,7 +9307,7 @@
           </a:ln>
           <a:extLst>
             <a:ext uri="{C572A759-6A51-4108-AA02-DFA0A04FC94B}">
-              <ma14:wrappingTextBoxFlag xmlns="" xmlns:m="http://schemas.openxmlformats.org/officeDocument/2006/math" xmlns:a14="http://schemas.microsoft.com/office/drawing/2010/main" xmlns:ma14="http://schemas.microsoft.com/office/mac/drawingml/2011/main" val="1"/>
+              <ma14:wrappingTextBoxFlag xmlns:ma14="http://schemas.microsoft.com/office/mac/drawingml/2011/main" xmlns:a14="http://schemas.microsoft.com/office/drawing/2010/main" xmlns:m="http://schemas.openxmlformats.org/officeDocument/2006/math" xmlns="" val="1"/>
             </a:ext>
           </a:extLst>
         </p:spPr>
@@ -8429,7 +9394,7 @@
           </a:ln>
           <a:extLst>
             <a:ext uri="{C572A759-6A51-4108-AA02-DFA0A04FC94B}">
-              <ma14:wrappingTextBoxFlag xmlns="" xmlns:m="http://schemas.openxmlformats.org/officeDocument/2006/math" xmlns:a14="http://schemas.microsoft.com/office/drawing/2010/main" xmlns:ma14="http://schemas.microsoft.com/office/mac/drawingml/2011/main" val="1"/>
+              <ma14:wrappingTextBoxFlag xmlns:ma14="http://schemas.microsoft.com/office/mac/drawingml/2011/main" xmlns:a14="http://schemas.microsoft.com/office/drawing/2010/main" xmlns:m="http://schemas.openxmlformats.org/officeDocument/2006/math" xmlns="" val="1"/>
             </a:ext>
           </a:extLst>
         </p:spPr>
@@ -8476,7 +9441,7 @@
           </a:ln>
           <a:extLst>
             <a:ext uri="{C572A759-6A51-4108-AA02-DFA0A04FC94B}">
-              <ma14:wrappingTextBoxFlag xmlns="" xmlns:m="http://schemas.openxmlformats.org/officeDocument/2006/math" xmlns:a14="http://schemas.microsoft.com/office/drawing/2010/main" xmlns:ma14="http://schemas.microsoft.com/office/mac/drawingml/2011/main" val="1"/>
+              <ma14:wrappingTextBoxFlag xmlns:ma14="http://schemas.microsoft.com/office/mac/drawingml/2011/main" xmlns:a14="http://schemas.microsoft.com/office/drawing/2010/main" xmlns:m="http://schemas.openxmlformats.org/officeDocument/2006/math" xmlns="" val="1"/>
             </a:ext>
           </a:extLst>
         </p:spPr>
@@ -8523,7 +9488,7 @@
           </a:ln>
           <a:extLst>
             <a:ext uri="{C572A759-6A51-4108-AA02-DFA0A04FC94B}">
-              <ma14:wrappingTextBoxFlag xmlns="" xmlns:m="http://schemas.openxmlformats.org/officeDocument/2006/math" xmlns:a14="http://schemas.microsoft.com/office/drawing/2010/main" xmlns:ma14="http://schemas.microsoft.com/office/mac/drawingml/2011/main" val="1"/>
+              <ma14:wrappingTextBoxFlag xmlns:ma14="http://schemas.microsoft.com/office/mac/drawingml/2011/main" xmlns:a14="http://schemas.microsoft.com/office/drawing/2010/main" xmlns:m="http://schemas.openxmlformats.org/officeDocument/2006/math" xmlns="" val="1"/>
             </a:ext>
           </a:extLst>
         </p:spPr>
@@ -8650,7 +9615,7 @@
           </a:ln>
           <a:extLst>
             <a:ext uri="{C572A759-6A51-4108-AA02-DFA0A04FC94B}">
-              <ma14:wrappingTextBoxFlag xmlns="" xmlns:m="http://schemas.openxmlformats.org/officeDocument/2006/math" xmlns:a14="http://schemas.microsoft.com/office/drawing/2010/main" xmlns:ma14="http://schemas.microsoft.com/office/mac/drawingml/2011/main" val="1"/>
+              <ma14:wrappingTextBoxFlag xmlns:ma14="http://schemas.microsoft.com/office/mac/drawingml/2011/main" xmlns:a14="http://schemas.microsoft.com/office/drawing/2010/main" xmlns:m="http://schemas.openxmlformats.org/officeDocument/2006/math" xmlns="" val="1"/>
             </a:ext>
           </a:extLst>
         </p:spPr>
@@ -8737,7 +9702,7 @@
           </a:ln>
           <a:extLst>
             <a:ext uri="{C572A759-6A51-4108-AA02-DFA0A04FC94B}">
-              <ma14:wrappingTextBoxFlag xmlns="" xmlns:m="http://schemas.openxmlformats.org/officeDocument/2006/math" xmlns:a14="http://schemas.microsoft.com/office/drawing/2010/main" xmlns:ma14="http://schemas.microsoft.com/office/mac/drawingml/2011/main" val="1"/>
+              <ma14:wrappingTextBoxFlag xmlns:ma14="http://schemas.microsoft.com/office/mac/drawingml/2011/main" xmlns:a14="http://schemas.microsoft.com/office/drawing/2010/main" xmlns:m="http://schemas.openxmlformats.org/officeDocument/2006/math" xmlns="" val="1"/>
             </a:ext>
           </a:extLst>
         </p:spPr>
@@ -8824,7 +9789,7 @@
           </a:ln>
           <a:extLst>
             <a:ext uri="{C572A759-6A51-4108-AA02-DFA0A04FC94B}">
-              <ma14:wrappingTextBoxFlag xmlns="" xmlns:m="http://schemas.openxmlformats.org/officeDocument/2006/math" xmlns:a14="http://schemas.microsoft.com/office/drawing/2010/main" xmlns:ma14="http://schemas.microsoft.com/office/mac/drawingml/2011/main" val="1"/>
+              <ma14:wrappingTextBoxFlag xmlns:ma14="http://schemas.microsoft.com/office/mac/drawingml/2011/main" xmlns:a14="http://schemas.microsoft.com/office/drawing/2010/main" xmlns:m="http://schemas.openxmlformats.org/officeDocument/2006/math" xmlns="" val="1"/>
             </a:ext>
           </a:extLst>
         </p:spPr>
@@ -8926,7 +9891,7 @@
           </a:ln>
           <a:extLst>
             <a:ext uri="{C572A759-6A51-4108-AA02-DFA0A04FC94B}">
-              <ma14:wrappingTextBoxFlag xmlns="" xmlns:m="http://schemas.openxmlformats.org/officeDocument/2006/math" xmlns:a14="http://schemas.microsoft.com/office/drawing/2010/main" xmlns:ma14="http://schemas.microsoft.com/office/mac/drawingml/2011/main" val="1"/>
+              <ma14:wrappingTextBoxFlag xmlns:ma14="http://schemas.microsoft.com/office/mac/drawingml/2011/main" xmlns:a14="http://schemas.microsoft.com/office/drawing/2010/main" xmlns:m="http://schemas.openxmlformats.org/officeDocument/2006/math" xmlns="" val="1"/>
             </a:ext>
           </a:extLst>
         </p:spPr>
@@ -8973,7 +9938,7 @@
           </a:ln>
           <a:extLst>
             <a:ext uri="{C572A759-6A51-4108-AA02-DFA0A04FC94B}">
-              <ma14:wrappingTextBoxFlag xmlns="" xmlns:m="http://schemas.openxmlformats.org/officeDocument/2006/math" xmlns:a14="http://schemas.microsoft.com/office/drawing/2010/main" xmlns:ma14="http://schemas.microsoft.com/office/mac/drawingml/2011/main" val="1"/>
+              <ma14:wrappingTextBoxFlag xmlns:ma14="http://schemas.microsoft.com/office/mac/drawingml/2011/main" xmlns:a14="http://schemas.microsoft.com/office/drawing/2010/main" xmlns:m="http://schemas.openxmlformats.org/officeDocument/2006/math" xmlns="" val="1"/>
             </a:ext>
           </a:extLst>
         </p:spPr>
@@ -9024,7 +9989,7 @@
           </a:ln>
           <a:extLst>
             <a:ext uri="{C572A759-6A51-4108-AA02-DFA0A04FC94B}">
-              <ma14:wrappingTextBoxFlag xmlns="" xmlns:m="http://schemas.openxmlformats.org/officeDocument/2006/math" xmlns:a14="http://schemas.microsoft.com/office/drawing/2010/main" xmlns:ma14="http://schemas.microsoft.com/office/mac/drawingml/2011/main" val="1"/>
+              <ma14:wrappingTextBoxFlag xmlns:ma14="http://schemas.microsoft.com/office/mac/drawingml/2011/main" xmlns:a14="http://schemas.microsoft.com/office/drawing/2010/main" xmlns:m="http://schemas.openxmlformats.org/officeDocument/2006/math" xmlns="" val="1"/>
             </a:ext>
           </a:extLst>
         </p:spPr>
@@ -9071,7 +10036,7 @@
           </a:ln>
           <a:extLst>
             <a:ext uri="{C572A759-6A51-4108-AA02-DFA0A04FC94B}">
-              <ma14:wrappingTextBoxFlag xmlns="" xmlns:m="http://schemas.openxmlformats.org/officeDocument/2006/math" xmlns:a14="http://schemas.microsoft.com/office/drawing/2010/main" xmlns:ma14="http://schemas.microsoft.com/office/mac/drawingml/2011/main" val="1"/>
+              <ma14:wrappingTextBoxFlag xmlns:ma14="http://schemas.microsoft.com/office/mac/drawingml/2011/main" xmlns:a14="http://schemas.microsoft.com/office/drawing/2010/main" xmlns:m="http://schemas.openxmlformats.org/officeDocument/2006/math" xmlns="" val="1"/>
             </a:ext>
           </a:extLst>
         </p:spPr>
@@ -9198,7 +10163,7 @@
           </a:ln>
           <a:extLst>
             <a:ext uri="{C572A759-6A51-4108-AA02-DFA0A04FC94B}">
-              <ma14:wrappingTextBoxFlag xmlns="" xmlns:m="http://schemas.openxmlformats.org/officeDocument/2006/math" xmlns:a14="http://schemas.microsoft.com/office/drawing/2010/main" xmlns:ma14="http://schemas.microsoft.com/office/mac/drawingml/2011/main" val="1"/>
+              <ma14:wrappingTextBoxFlag xmlns:ma14="http://schemas.microsoft.com/office/mac/drawingml/2011/main" xmlns:a14="http://schemas.microsoft.com/office/drawing/2010/main" xmlns:m="http://schemas.openxmlformats.org/officeDocument/2006/math" xmlns="" val="1"/>
             </a:ext>
           </a:extLst>
         </p:spPr>
@@ -9285,7 +10250,7 @@
           </a:ln>
           <a:extLst>
             <a:ext uri="{C572A759-6A51-4108-AA02-DFA0A04FC94B}">
-              <ma14:wrappingTextBoxFlag xmlns="" xmlns:m="http://schemas.openxmlformats.org/officeDocument/2006/math" xmlns:a14="http://schemas.microsoft.com/office/drawing/2010/main" xmlns:ma14="http://schemas.microsoft.com/office/mac/drawingml/2011/main" val="1"/>
+              <ma14:wrappingTextBoxFlag xmlns:ma14="http://schemas.microsoft.com/office/mac/drawingml/2011/main" xmlns:a14="http://schemas.microsoft.com/office/drawing/2010/main" xmlns:m="http://schemas.openxmlformats.org/officeDocument/2006/math" xmlns="" val="1"/>
             </a:ext>
           </a:extLst>
         </p:spPr>
@@ -9372,7 +10337,7 @@
           </a:ln>
           <a:extLst>
             <a:ext uri="{C572A759-6A51-4108-AA02-DFA0A04FC94B}">
-              <ma14:wrappingTextBoxFlag xmlns="" xmlns:m="http://schemas.openxmlformats.org/officeDocument/2006/math" xmlns:a14="http://schemas.microsoft.com/office/drawing/2010/main" xmlns:ma14="http://schemas.microsoft.com/office/mac/drawingml/2011/main" val="1"/>
+              <ma14:wrappingTextBoxFlag xmlns:ma14="http://schemas.microsoft.com/office/mac/drawingml/2011/main" xmlns:a14="http://schemas.microsoft.com/office/drawing/2010/main" xmlns:m="http://schemas.openxmlformats.org/officeDocument/2006/math" xmlns="" val="1"/>
             </a:ext>
           </a:extLst>
         </p:spPr>
@@ -9459,7 +10424,7 @@
           </a:ln>
           <a:extLst>
             <a:ext uri="{C572A759-6A51-4108-AA02-DFA0A04FC94B}">
-              <ma14:wrappingTextBoxFlag xmlns="" xmlns:m="http://schemas.openxmlformats.org/officeDocument/2006/math" xmlns:a14="http://schemas.microsoft.com/office/drawing/2010/main" xmlns:ma14="http://schemas.microsoft.com/office/mac/drawingml/2011/main" val="1"/>
+              <ma14:wrappingTextBoxFlag xmlns:ma14="http://schemas.microsoft.com/office/mac/drawingml/2011/main" xmlns:a14="http://schemas.microsoft.com/office/drawing/2010/main" xmlns:m="http://schemas.openxmlformats.org/officeDocument/2006/math" xmlns="" val="1"/>
             </a:ext>
           </a:extLst>
         </p:spPr>
@@ -9506,7 +10471,7 @@
           </a:ln>
           <a:extLst>
             <a:ext uri="{C572A759-6A51-4108-AA02-DFA0A04FC94B}">
-              <ma14:wrappingTextBoxFlag xmlns="" xmlns:m="http://schemas.openxmlformats.org/officeDocument/2006/math" xmlns:a14="http://schemas.microsoft.com/office/drawing/2010/main" xmlns:ma14="http://schemas.microsoft.com/office/mac/drawingml/2011/main" val="1"/>
+              <ma14:wrappingTextBoxFlag xmlns:ma14="http://schemas.microsoft.com/office/mac/drawingml/2011/main" xmlns:a14="http://schemas.microsoft.com/office/drawing/2010/main" xmlns:m="http://schemas.openxmlformats.org/officeDocument/2006/math" xmlns="" val="1"/>
             </a:ext>
           </a:extLst>
         </p:spPr>
@@ -9590,7 +10555,7 @@
           </a:ln>
           <a:extLst>
             <a:ext uri="{C572A759-6A51-4108-AA02-DFA0A04FC94B}">
-              <ma14:wrappingTextBoxFlag xmlns="" xmlns:m="http://schemas.openxmlformats.org/officeDocument/2006/math" xmlns:a14="http://schemas.microsoft.com/office/drawing/2010/main" xmlns:ma14="http://schemas.microsoft.com/office/mac/drawingml/2011/main" val="1"/>
+              <ma14:wrappingTextBoxFlag xmlns:ma14="http://schemas.microsoft.com/office/mac/drawingml/2011/main" xmlns:a14="http://schemas.microsoft.com/office/drawing/2010/main" xmlns:m="http://schemas.openxmlformats.org/officeDocument/2006/math" xmlns="" val="1"/>
             </a:ext>
           </a:extLst>
         </p:spPr>
@@ -9749,7 +10714,7 @@
           </a:ln>
           <a:extLst>
             <a:ext uri="{C572A759-6A51-4108-AA02-DFA0A04FC94B}">
-              <ma14:wrappingTextBoxFlag xmlns="" xmlns:m="http://schemas.openxmlformats.org/officeDocument/2006/math" xmlns:a14="http://schemas.microsoft.com/office/drawing/2010/main" xmlns:ma14="http://schemas.microsoft.com/office/mac/drawingml/2011/main" val="1"/>
+              <ma14:wrappingTextBoxFlag xmlns:ma14="http://schemas.microsoft.com/office/mac/drawingml/2011/main" xmlns:a14="http://schemas.microsoft.com/office/drawing/2010/main" xmlns:m="http://schemas.openxmlformats.org/officeDocument/2006/math" xmlns="" val="1"/>
             </a:ext>
           </a:extLst>
         </p:spPr>
@@ -9786,9 +10751,9 @@
         <p:grpSpPr>
           <a:xfrm>
             <a:off x="30001" y="-158261"/>
-            <a:ext cx="24842178" cy="14043612"/>
+            <a:ext cx="24491768" cy="14043612"/>
             <a:chOff x="0" y="0"/>
-            <a:chExt cx="24464234" cy="13591275"/>
+            <a:chExt cx="24119155" cy="13591275"/>
           </a:xfrm>
         </p:grpSpPr>
         <p:grpSp>
@@ -9888,7 +10853,7 @@
                 <a:effectLst/>
                 <a:extLst>
                   <a:ext uri="{C572A759-6A51-4108-AA02-DFA0A04FC94B}">
-                    <ma14:wrappingTextBoxFlag xmlns="" xmlns:m="http://schemas.openxmlformats.org/officeDocument/2006/math" xmlns:a14="http://schemas.microsoft.com/office/drawing/2010/main" xmlns:ma14="http://schemas.microsoft.com/office/mac/drawingml/2011/main" val="1"/>
+                    <ma14:wrappingTextBoxFlag xmlns:ma14="http://schemas.microsoft.com/office/mac/drawingml/2011/main" xmlns:a14="http://schemas.microsoft.com/office/drawing/2010/main" xmlns:m="http://schemas.openxmlformats.org/officeDocument/2006/math" xmlns="" val="1"/>
                   </a:ext>
                 </a:extLst>
               </p:spPr>
@@ -9940,7 +10905,7 @@
               <a:effectLst/>
               <a:extLst>
                 <a:ext uri="{C572A759-6A51-4108-AA02-DFA0A04FC94B}">
-                  <ma14:wrappingTextBoxFlag xmlns="" xmlns:m="http://schemas.openxmlformats.org/officeDocument/2006/math" xmlns:a14="http://schemas.microsoft.com/office/drawing/2010/main" xmlns:ma14="http://schemas.microsoft.com/office/mac/drawingml/2011/main" val="1"/>
+                  <ma14:wrappingTextBoxFlag xmlns:ma14="http://schemas.microsoft.com/office/mac/drawingml/2011/main" xmlns:a14="http://schemas.microsoft.com/office/drawing/2010/main" xmlns:m="http://schemas.openxmlformats.org/officeDocument/2006/math" xmlns="" val="1"/>
                 </a:ext>
               </a:extLst>
             </p:spPr>
@@ -9962,7 +10927,7 @@
                 </a:lvl1pPr>
               </a:lstStyle>
               <a:p>
-                <a:pPr marL="514350" indent="-514350">
+                <a:pPr marL="514350" indent="-514350" algn="just">
                   <a:buFont typeface="+mj-lt"/>
                   <a:buAutoNum type="arabicPeriod"/>
                 </a:pPr>
@@ -9972,7 +10937,7 @@
                 </a:r>
               </a:p>
               <a:p>
-                <a:pPr marL="514350" indent="-514350">
+                <a:pPr marL="514350" indent="-514350" algn="just">
                   <a:buFont typeface="+mj-lt"/>
                   <a:buAutoNum type="arabicPeriod"/>
                 </a:pPr>
@@ -9986,7 +10951,7 @@
                 </a:r>
               </a:p>
               <a:p>
-                <a:pPr marL="514350" indent="-514350">
+                <a:pPr marL="514350" indent="-514350" algn="just">
                   <a:buFont typeface="+mj-lt"/>
                   <a:buAutoNum type="arabicPeriod"/>
                 </a:pPr>
@@ -10000,7 +10965,7 @@
                 </a:r>
               </a:p>
               <a:p>
-                <a:pPr marL="514350" indent="-514350">
+                <a:pPr marL="514350" indent="-514350" algn="just">
                   <a:buFont typeface="+mj-lt"/>
                   <a:buAutoNum type="arabicPeriod"/>
                 </a:pPr>
@@ -10014,7 +10979,7 @@
                 </a:r>
               </a:p>
               <a:p>
-                <a:pPr marL="514350" indent="-514350">
+                <a:pPr marL="514350" indent="-514350" algn="just">
                   <a:buFont typeface="+mj-lt"/>
                   <a:buAutoNum type="arabicPeriod"/>
                 </a:pPr>
@@ -10028,7 +10993,7 @@
                 </a:r>
               </a:p>
               <a:p>
-                <a:pPr marL="514350" indent="-514350">
+                <a:pPr marL="514350" indent="-514350" algn="just">
                   <a:buFont typeface="+mj-lt"/>
                   <a:buAutoNum type="arabicPeriod"/>
                 </a:pPr>
@@ -10042,7 +11007,7 @@
                 </a:r>
               </a:p>
               <a:p>
-                <a:pPr marL="514350" indent="-514350">
+                <a:pPr marL="514350" indent="-514350" algn="just">
                   <a:buFont typeface="+mj-lt"/>
                   <a:buAutoNum type="arabicPeriod"/>
                 </a:pPr>
@@ -10052,7 +11017,7 @@
                 </a:r>
               </a:p>
               <a:p>
-                <a:pPr marL="514350" indent="-514350">
+                <a:pPr marL="514350" indent="-514350" algn="just">
                   <a:buFont typeface="+mj-lt"/>
                   <a:buAutoNum type="arabicPeriod"/>
                 </a:pPr>
@@ -10062,7 +11027,7 @@
                 </a:r>
               </a:p>
               <a:p>
-                <a:pPr marL="514350" indent="-514350">
+                <a:pPr marL="514350" indent="-514350" algn="just">
                   <a:buFont typeface="+mj-lt"/>
                   <a:buAutoNum type="arabicPeriod"/>
                 </a:pPr>
@@ -10072,12 +11037,14 @@
                 </a:r>
               </a:p>
               <a:p>
+                <a:pPr algn="just"/>
                 <a:r>
                   <a:rPr lang="pt-BR" dirty="0"/>
                   <a:t>	-Web</a:t>
                 </a:r>
               </a:p>
               <a:p>
+                <a:pPr algn="just"/>
                 <a:r>
                   <a:rPr lang="pt-BR" dirty="0"/>
                   <a:t>	-</a:t>
@@ -10088,6 +11055,7 @@
                 </a:r>
               </a:p>
               <a:p>
+                <a:pPr algn="just"/>
                 <a:r>
                   <a:rPr lang="pt-BR" dirty="0" smtClean="0"/>
                   <a:t>10. Promoção de bem-estar;</a:t>
@@ -10206,7 +11174,7 @@
                 <a:effectLst/>
                 <a:extLst>
                   <a:ext uri="{C572A759-6A51-4108-AA02-DFA0A04FC94B}">
-                    <ma14:wrappingTextBoxFlag xmlns="" xmlns:m="http://schemas.openxmlformats.org/officeDocument/2006/math" xmlns:a14="http://schemas.microsoft.com/office/drawing/2010/main" xmlns:ma14="http://schemas.microsoft.com/office/mac/drawingml/2011/main" val="1"/>
+                    <ma14:wrappingTextBoxFlag xmlns:ma14="http://schemas.microsoft.com/office/mac/drawingml/2011/main" xmlns:a14="http://schemas.microsoft.com/office/drawing/2010/main" xmlns:m="http://schemas.openxmlformats.org/officeDocument/2006/math" xmlns="" val="1"/>
                   </a:ext>
                 </a:extLst>
               </p:spPr>
@@ -10244,7 +11212,7 @@
             </p:nvSpPr>
             <p:spPr>
               <a:xfrm>
-                <a:off x="406600" y="1526435"/>
+                <a:off x="256371" y="1594508"/>
                 <a:ext cx="5641035" cy="8361936"/>
               </a:xfrm>
               <a:prstGeom prst="rect">
@@ -10258,7 +11226,7 @@
               <a:effectLst/>
               <a:extLst>
                 <a:ext uri="{C572A759-6A51-4108-AA02-DFA0A04FC94B}">
-                  <ma14:wrappingTextBoxFlag xmlns="" xmlns:m="http://schemas.openxmlformats.org/officeDocument/2006/math" xmlns:a14="http://schemas.microsoft.com/office/drawing/2010/main" xmlns:ma14="http://schemas.microsoft.com/office/mac/drawingml/2011/main" val="1"/>
+                  <ma14:wrappingTextBoxFlag xmlns:ma14="http://schemas.microsoft.com/office/mac/drawingml/2011/main" xmlns:a14="http://schemas.microsoft.com/office/drawing/2010/main" xmlns:m="http://schemas.openxmlformats.org/officeDocument/2006/math" xmlns="" val="1"/>
                 </a:ext>
               </a:extLst>
             </p:spPr>
@@ -10280,7 +11248,7 @@
                 </a:lvl1pPr>
               </a:lstStyle>
               <a:p>
-                <a:pPr marL="514350" indent="-514350">
+                <a:pPr marL="514350" indent="-514350" algn="just">
                   <a:buFont typeface="+mj-lt"/>
                   <a:buAutoNum type="arabicPeriod"/>
                 </a:pPr>
@@ -10290,7 +11258,7 @@
                 </a:r>
               </a:p>
               <a:p>
-                <a:pPr marL="514350" indent="-514350">
+                <a:pPr marL="514350" indent="-514350" algn="just">
                   <a:buFont typeface="+mj-lt"/>
                   <a:buAutoNum type="arabicPeriod"/>
                 </a:pPr>
@@ -10300,7 +11268,7 @@
                 </a:r>
               </a:p>
               <a:p>
-                <a:pPr marL="514350" indent="-514350">
+                <a:pPr marL="514350" indent="-514350" algn="just">
                   <a:buFont typeface="+mj-lt"/>
                   <a:buAutoNum type="arabicPeriod"/>
                 </a:pPr>
@@ -10310,7 +11278,7 @@
                 </a:r>
               </a:p>
               <a:p>
-                <a:pPr marL="514350" indent="-514350">
+                <a:pPr marL="514350" indent="-514350" algn="just">
                   <a:buFont typeface="+mj-lt"/>
                   <a:buAutoNum type="arabicPeriod"/>
                 </a:pPr>
@@ -10320,7 +11288,7 @@
                 </a:r>
               </a:p>
               <a:p>
-                <a:pPr marL="514350" indent="-514350">
+                <a:pPr marL="514350" indent="-514350" algn="just">
                   <a:buFont typeface="+mj-lt"/>
                   <a:buAutoNum type="arabicPeriod"/>
                 </a:pPr>
@@ -10330,7 +11298,7 @@
                 </a:r>
               </a:p>
               <a:p>
-                <a:pPr marL="514350" indent="-514350">
+                <a:pPr marL="514350" indent="-514350" algn="just">
                   <a:buFont typeface="+mj-lt"/>
                   <a:buAutoNum type="arabicPeriod"/>
                 </a:pPr>
@@ -10340,7 +11308,7 @@
                 </a:r>
               </a:p>
               <a:p>
-                <a:pPr marL="514350" indent="-514350">
+                <a:pPr marL="514350" indent="-514350" algn="just">
                   <a:buFont typeface="+mj-lt"/>
                   <a:buAutoNum type="arabicPeriod"/>
                 </a:pPr>
@@ -10350,7 +11318,7 @@
                 </a:r>
               </a:p>
               <a:p>
-                <a:pPr marL="514350" indent="-514350">
+                <a:pPr marL="514350" indent="-514350" algn="just">
                   <a:buFont typeface="+mj-lt"/>
                   <a:buAutoNum type="arabicPeriod"/>
                 </a:pPr>
@@ -10360,7 +11328,7 @@
                 </a:r>
               </a:p>
               <a:p>
-                <a:pPr marL="514350" indent="-514350">
+                <a:pPr marL="514350" indent="-514350" algn="just">
                   <a:buFont typeface="+mj-lt"/>
                   <a:buAutoNum type="arabicPeriod"/>
                 </a:pPr>
@@ -10368,9 +11336,10 @@
                   <a:rPr lang="pt-BR" dirty="0" smtClean="0"/>
                   <a:t>Acessibilidade;</a:t>
                 </a:r>
+                <a:endParaRPr lang="pt-BR" dirty="0" smtClean="0"/>
               </a:p>
               <a:p>
-                <a:pPr marL="514350" indent="-514350">
+                <a:pPr marL="514350" indent="-514350" algn="just">
                   <a:buFont typeface="+mj-lt"/>
                   <a:buAutoNum type="arabicPeriod"/>
                 </a:pPr>
@@ -10415,9 +11384,9 @@
           <p:grpSpPr>
             <a:xfrm>
               <a:off x="12954909" y="0"/>
-              <a:ext cx="11237063" cy="4479617"/>
+              <a:ext cx="11028572" cy="4479617"/>
               <a:chOff x="0" y="0"/>
-              <a:chExt cx="11237061" cy="4479616"/>
+              <a:chExt cx="11028570" cy="4479616"/>
             </a:xfrm>
           </p:grpSpPr>
           <p:grpSp>
@@ -10429,9 +11398,9 @@
             <p:grpSpPr>
               <a:xfrm>
                 <a:off x="0" y="0"/>
-                <a:ext cx="11237061" cy="4479616"/>
+                <a:ext cx="11028570" cy="4479616"/>
                 <a:chOff x="0" y="0"/>
-                <a:chExt cx="11237060" cy="4479615"/>
+                <a:chExt cx="11028569" cy="4479615"/>
               </a:xfrm>
             </p:grpSpPr>
             <p:sp>
@@ -10443,7 +11412,7 @@
               <p:spPr>
                 <a:xfrm>
                   <a:off x="0" y="0"/>
-                  <a:ext cx="11237060" cy="4479615"/>
+                  <a:ext cx="11028569" cy="4479615"/>
                 </a:xfrm>
                 <a:prstGeom prst="rect">
                   <a:avLst/>
@@ -10500,7 +11469,7 @@
                 <a:effectLst/>
                 <a:extLst>
                   <a:ext uri="{C572A759-6A51-4108-AA02-DFA0A04FC94B}">
-                    <ma14:wrappingTextBoxFlag xmlns="" xmlns:m="http://schemas.openxmlformats.org/officeDocument/2006/math" xmlns:a14="http://schemas.microsoft.com/office/drawing/2010/main" xmlns:ma14="http://schemas.microsoft.com/office/mac/drawingml/2011/main" val="1"/>
+                    <ma14:wrappingTextBoxFlag xmlns:ma14="http://schemas.microsoft.com/office/mac/drawingml/2011/main" xmlns:a14="http://schemas.microsoft.com/office/drawing/2010/main" xmlns:m="http://schemas.openxmlformats.org/officeDocument/2006/math" xmlns="" val="1"/>
                   </a:ext>
                 </a:extLst>
               </p:spPr>
@@ -10537,8 +11506,8 @@
             </p:nvSpPr>
             <p:spPr>
               <a:xfrm>
-                <a:off x="314172" y="1519008"/>
-                <a:ext cx="10307360" cy="1961482"/>
+                <a:off x="314172" y="1580383"/>
+                <a:ext cx="10307360" cy="1838731"/>
               </a:xfrm>
               <a:prstGeom prst="rect">
                 <a:avLst/>
@@ -10551,7 +11520,7 @@
               <a:effectLst/>
               <a:extLst>
                 <a:ext uri="{C572A759-6A51-4108-AA02-DFA0A04FC94B}">
-                  <ma14:wrappingTextBoxFlag xmlns="" xmlns:m="http://schemas.openxmlformats.org/officeDocument/2006/math" xmlns:a14="http://schemas.microsoft.com/office/drawing/2010/main" xmlns:ma14="http://schemas.microsoft.com/office/mac/drawingml/2011/main" val="1"/>
+                  <ma14:wrappingTextBoxFlag xmlns:ma14="http://schemas.microsoft.com/office/mac/drawingml/2011/main" xmlns:a14="http://schemas.microsoft.com/office/drawing/2010/main" xmlns:m="http://schemas.openxmlformats.org/officeDocument/2006/math" xmlns="" val="1"/>
                 </a:ext>
               </a:extLst>
             </p:spPr>
@@ -10575,10 +11544,18 @@
               <a:p>
                 <a:pPr algn="just"/>
                 <a:r>
-                  <a:rPr lang="pt-BR" dirty="0" smtClean="0"/>
-                  <a:t>Criar um aplicativo que ajude usuários a gerenciar suas finanças pessoais de forma eficaz, incluindo controle de orçamento, despesas, metas financeiras e geração de relatórios.</a:t>
-                </a:r>
-                <a:endParaRPr dirty="0"/>
+                  <a:rPr lang="pt-BR" sz="2400" dirty="0"/>
+                  <a:t>Criar um aplicativo que ajude usuários a gerenciar suas finanças pessoais de forma eficaz, incluindo controle de orçamento, despesas, metas financeiras e geração de relatórios. O aplicativo se destacará pela personalização e pela educação financeira, oferecendo um suporte </a:t>
+                </a:r>
+                <a:r>
+                  <a:rPr lang="pt-BR" sz="2400" dirty="0" smtClean="0"/>
+                  <a:t>aos </a:t>
+                </a:r>
+                <a:r>
+                  <a:rPr lang="pt-BR" sz="2400" dirty="0"/>
+                  <a:t>usuários.</a:t>
+                </a:r>
+                <a:endParaRPr sz="2400" dirty="0"/>
               </a:p>
             </p:txBody>
           </p:sp>
@@ -10592,9 +11569,9 @@
           <p:grpSpPr>
             <a:xfrm>
               <a:off x="12954909" y="4533670"/>
-              <a:ext cx="11192175" cy="5813205"/>
+              <a:ext cx="11028572" cy="5030571"/>
               <a:chOff x="-22444" y="27026"/>
-              <a:chExt cx="11192174" cy="5813203"/>
+              <a:chExt cx="11028571" cy="5030569"/>
             </a:xfrm>
           </p:grpSpPr>
           <p:grpSp>
@@ -10606,9 +11583,9 @@
             <p:grpSpPr>
               <a:xfrm>
                 <a:off x="-22444" y="27026"/>
-                <a:ext cx="11192174" cy="5246370"/>
+                <a:ext cx="11028571" cy="5030569"/>
                 <a:chOff x="-22444" y="27026"/>
-                <a:chExt cx="11192173" cy="5246369"/>
+                <a:chExt cx="11028570" cy="5030568"/>
               </a:xfrm>
             </p:grpSpPr>
             <p:sp>
@@ -10620,7 +11597,7 @@
               <p:spPr>
                 <a:xfrm>
                   <a:off x="-22444" y="27026"/>
-                  <a:ext cx="11192173" cy="5246369"/>
+                  <a:ext cx="11028570" cy="5030568"/>
                 </a:xfrm>
                 <a:prstGeom prst="rect">
                   <a:avLst/>
@@ -10677,7 +11654,7 @@
                 <a:effectLst/>
                 <a:extLst>
                   <a:ext uri="{C572A759-6A51-4108-AA02-DFA0A04FC94B}">
-                    <ma14:wrappingTextBoxFlag xmlns="" xmlns:m="http://schemas.openxmlformats.org/officeDocument/2006/math" xmlns:a14="http://schemas.microsoft.com/office/drawing/2010/main" xmlns:ma14="http://schemas.microsoft.com/office/mac/drawingml/2011/main" val="1"/>
+                    <ma14:wrappingTextBoxFlag xmlns:ma14="http://schemas.microsoft.com/office/mac/drawingml/2011/main" xmlns:a14="http://schemas.microsoft.com/office/drawing/2010/main" xmlns:m="http://schemas.openxmlformats.org/officeDocument/2006/math" xmlns="" val="1"/>
                   </a:ext>
                 </a:extLst>
               </p:spPr>
@@ -10715,8 +11692,8 @@
             </p:nvSpPr>
             <p:spPr>
               <a:xfrm>
-                <a:off x="138098" y="710111"/>
-                <a:ext cx="9970221" cy="5130118"/>
+                <a:off x="269284" y="902128"/>
+                <a:ext cx="9970221" cy="3655696"/>
               </a:xfrm>
               <a:prstGeom prst="rect">
                 <a:avLst/>
@@ -10729,7 +11706,7 @@
               <a:effectLst/>
               <a:extLst>
                 <a:ext uri="{C572A759-6A51-4108-AA02-DFA0A04FC94B}">
-                  <ma14:wrappingTextBoxFlag xmlns="" xmlns:m="http://schemas.openxmlformats.org/officeDocument/2006/math" xmlns:a14="http://schemas.microsoft.com/office/drawing/2010/main" xmlns:ma14="http://schemas.microsoft.com/office/mac/drawingml/2011/main" val="1"/>
+                  <ma14:wrappingTextBoxFlag xmlns:ma14="http://schemas.microsoft.com/office/mac/drawingml/2011/main" xmlns:a14="http://schemas.microsoft.com/office/drawing/2010/main" xmlns:m="http://schemas.openxmlformats.org/officeDocument/2006/math" xmlns="" val="1"/>
                 </a:ext>
               </a:extLst>
             </p:spPr>
@@ -10751,91 +11728,141 @@
                 </a:lvl1pPr>
               </a:lstStyle>
               <a:p>
-                <a:pPr marL="514350" indent="-514350">
+                <a:pPr marL="514350" indent="-514350" algn="just">
                   <a:buFont typeface="+mj-lt"/>
                   <a:buAutoNum type="arabicPeriod"/>
                 </a:pPr>
                 <a:r>
-                  <a:rPr lang="pt-BR" dirty="0" smtClean="0"/>
-                  <a:t>Como garantir a segurança dos dados do usuário?</a:t>
+                  <a:rPr lang="pt-BR" sz="2000" dirty="0"/>
+                  <a:t>Como garantir a segurança dos dados do usuário</a:t>
+                </a:r>
+                <a:r>
+                  <a:rPr lang="pt-BR" sz="2000" dirty="0" smtClean="0"/>
+                  <a:t>?</a:t>
                 </a:r>
               </a:p>
               <a:p>
-                <a:pPr marL="514350" indent="-514350">
+                <a:pPr marL="514350" indent="-514350" algn="just">
                   <a:buFont typeface="+mj-lt"/>
                   <a:buAutoNum type="arabicPeriod"/>
                 </a:pPr>
                 <a:r>
-                  <a:rPr lang="pt-BR" dirty="0" smtClean="0"/>
-                  <a:t>Como abordadremos a escalabilidade do </a:t>
-                </a:r>
-                <a:r>
-                  <a:rPr lang="pt-BR" dirty="0" smtClean="0"/>
-                  <a:t>aplicativo?</a:t>
-                </a:r>
-                <a:endParaRPr lang="pt-BR" dirty="0" smtClean="0"/>
+                  <a:rPr lang="pt-BR" sz="2000" dirty="0" smtClean="0"/>
+                  <a:t>Como </a:t>
+                </a:r>
+                <a:r>
+                  <a:rPr lang="pt-BR" sz="2000" dirty="0"/>
+                  <a:t>abordaremos a escalabilidade do aplicativo</a:t>
+                </a:r>
+                <a:r>
+                  <a:rPr lang="pt-BR" sz="2000" dirty="0" smtClean="0"/>
+                  <a:t>?</a:t>
+                </a:r>
               </a:p>
               <a:p>
-                <a:pPr marL="514350" indent="-514350">
+                <a:pPr marL="514350" indent="-514350" algn="just">
                   <a:buFont typeface="+mj-lt"/>
                   <a:buAutoNum type="arabicPeriod"/>
                 </a:pPr>
                 <a:r>
-                  <a:rPr lang="pt-BR" dirty="0" smtClean="0"/>
-                  <a:t>Como garantiremps uma experiência de usuário </a:t>
-                </a:r>
-                <a:r>
-                  <a:rPr lang="pt-BR" dirty="0" smtClean="0"/>
-                  <a:t>satisfatória?</a:t>
-                </a:r>
-                <a:endParaRPr lang="pt-BR" dirty="0" smtClean="0"/>
+                  <a:rPr lang="pt-BR" sz="2000" dirty="0" smtClean="0"/>
+                  <a:t>Como </a:t>
+                </a:r>
+                <a:r>
+                  <a:rPr lang="pt-BR" sz="2000" dirty="0"/>
+                  <a:t>garantiremos uma experiência de usuário satisfatória</a:t>
+                </a:r>
+                <a:r>
+                  <a:rPr lang="pt-BR" sz="2000" dirty="0" smtClean="0"/>
+                  <a:t>?</a:t>
+                </a:r>
               </a:p>
               <a:p>
-                <a:pPr marL="514350" indent="-514350">
+                <a:pPr marL="514350" indent="-514350" algn="just">
                   <a:buFont typeface="+mj-lt"/>
                   <a:buAutoNum type="arabicPeriod"/>
                 </a:pPr>
                 <a:r>
-                  <a:rPr lang="pt-BR" dirty="0" smtClean="0"/>
-                  <a:t>Como eduacar o usuário a guardar mais </a:t>
-                </a:r>
-                <a:r>
-                  <a:rPr lang="pt-BR" dirty="0" smtClean="0"/>
-                  <a:t>dinheiro?</a:t>
-                </a:r>
-                <a:endParaRPr lang="pt-BR" dirty="0" smtClean="0"/>
+                  <a:rPr lang="pt-BR" sz="2000" dirty="0" smtClean="0"/>
+                  <a:t>Como </a:t>
+                </a:r>
+                <a:r>
+                  <a:rPr lang="pt-BR" sz="2000" dirty="0"/>
+                  <a:t>educar o usuário a guardar mais dinheiro</a:t>
+                </a:r>
+                <a:r>
+                  <a:rPr lang="pt-BR" sz="2000" dirty="0" smtClean="0"/>
+                  <a:t>?</a:t>
+                </a:r>
               </a:p>
               <a:p>
-                <a:pPr marL="514350" indent="-514350">
+                <a:pPr marL="514350" indent="-514350" algn="just">
                   <a:buFont typeface="+mj-lt"/>
                   <a:buAutoNum type="arabicPeriod"/>
                 </a:pPr>
                 <a:r>
-                  <a:rPr lang="pt-BR" dirty="0" smtClean="0"/>
-                  <a:t>Qual a estrategia para novas </a:t>
-                </a:r>
-                <a:r>
-                  <a:rPr lang="pt-BR" dirty="0" smtClean="0"/>
-                  <a:t>funcionalidades?</a:t>
+                  <a:rPr lang="pt-BR" sz="2000" dirty="0" smtClean="0"/>
+                  <a:t>Qual </a:t>
+                </a:r>
+                <a:r>
+                  <a:rPr lang="pt-BR" sz="2000" dirty="0"/>
+                  <a:t>a estratégia para novas funcionalidades</a:t>
+                </a:r>
+                <a:r>
+                  <a:rPr lang="pt-BR" sz="2000" dirty="0" smtClean="0"/>
+                  <a:t>?</a:t>
                 </a:r>
               </a:p>
               <a:p>
-                <a:pPr marL="514350" indent="-514350">
+                <a:pPr marL="514350" indent="-514350" algn="just">
                   <a:buFont typeface="+mj-lt"/>
                   <a:buAutoNum type="arabicPeriod"/>
                 </a:pPr>
                 <a:r>
-                  <a:rPr lang="pt-BR" dirty="0"/>
-                  <a:t>Como lidaremos com o gerenciamento e a análise de grandes volumes de dados financeiros?</a:t>
-                </a:r>
-                <a:endParaRPr lang="pt-BR" dirty="0" smtClean="0"/>
+                  <a:rPr lang="pt-BR" sz="2000" dirty="0" smtClean="0"/>
+                  <a:t>Como </a:t>
+                </a:r>
+                <a:r>
+                  <a:rPr lang="pt-BR" sz="2000" dirty="0"/>
+                  <a:t>lidaremos com o gerenciamento e a análise de grandes volumes de dados financeiros</a:t>
+                </a:r>
+                <a:r>
+                  <a:rPr lang="pt-BR" sz="2000" dirty="0" smtClean="0"/>
+                  <a:t>?</a:t>
+                </a:r>
               </a:p>
               <a:p>
-                <a:pPr marL="514350" indent="-514350">
+                <a:pPr marL="514350" indent="-514350" algn="just">
                   <a:buFont typeface="+mj-lt"/>
                   <a:buAutoNum type="arabicPeriod"/>
                 </a:pPr>
-                <a:endParaRPr lang="pt-BR" dirty="0" smtClean="0"/>
+                <a:r>
+                  <a:rPr lang="pt-BR" sz="2000" dirty="0" smtClean="0"/>
+                  <a:t>Como </a:t>
+                </a:r>
+                <a:r>
+                  <a:rPr lang="pt-BR" sz="2000" dirty="0"/>
+                  <a:t>garantiremos a privacidade dos dados do usuário em nossas integrações</a:t>
+                </a:r>
+                <a:r>
+                  <a:rPr lang="pt-BR" sz="2000" dirty="0" smtClean="0"/>
+                  <a:t>?</a:t>
+                </a:r>
+              </a:p>
+              <a:p>
+                <a:pPr marL="514350" indent="-514350" algn="just">
+                  <a:buFont typeface="+mj-lt"/>
+                  <a:buAutoNum type="arabicPeriod"/>
+                </a:pPr>
+                <a:r>
+                  <a:rPr lang="pt-BR" sz="2000" dirty="0" smtClean="0"/>
+                  <a:t>Quais </a:t>
+                </a:r>
+                <a:r>
+                  <a:rPr lang="pt-BR" sz="2000" dirty="0"/>
+                  <a:t>estratégias usaremos para manter o engajamento dos usuários?</a:t>
+                </a:r>
+                <a:endParaRPr lang="pt-BR" sz="2000" dirty="0" smtClean="0"/>
               </a:p>
               <a:p>
                 <a:endParaRPr lang="pt-BR" dirty="0" smtClean="0"/>
@@ -10858,10 +11885,10 @@
           </p:nvGrpSpPr>
           <p:grpSpPr>
             <a:xfrm>
-              <a:off x="12985818" y="9166917"/>
-              <a:ext cx="11478416" cy="4387578"/>
-              <a:chOff x="-1" y="-613124"/>
-              <a:chExt cx="11478415" cy="4387575"/>
+              <a:off x="12954909" y="9662750"/>
+              <a:ext cx="11164246" cy="3759453"/>
+              <a:chOff x="-30910" y="-117291"/>
+              <a:chExt cx="11164245" cy="3759450"/>
             </a:xfrm>
           </p:grpSpPr>
           <p:grpSp>
@@ -10872,10 +11899,10 @@
             </p:nvGrpSpPr>
             <p:grpSpPr>
               <a:xfrm>
-                <a:off x="-1" y="-613124"/>
-                <a:ext cx="11175241" cy="4387575"/>
-                <a:chOff x="-1" y="-613124"/>
-                <a:chExt cx="11175240" cy="4387574"/>
+                <a:off x="-30910" y="-117291"/>
+                <a:ext cx="11028571" cy="3759450"/>
+                <a:chOff x="-30910" y="-117291"/>
+                <a:chExt cx="11028570" cy="3759449"/>
               </a:xfrm>
             </p:grpSpPr>
             <p:sp>
@@ -10886,8 +11913,8 @@
               </p:nvSpPr>
               <p:spPr>
                 <a:xfrm>
-                  <a:off x="-1" y="-63919"/>
-                  <a:ext cx="11175240" cy="3838369"/>
+                  <a:off x="-30910" y="-117291"/>
+                  <a:ext cx="11028570" cy="3759449"/>
                 </a:xfrm>
                 <a:prstGeom prst="rect">
                   <a:avLst/>
@@ -10930,7 +11957,7 @@
               </p:nvSpPr>
               <p:spPr>
                 <a:xfrm>
-                  <a:off x="185011" y="-613124"/>
+                  <a:off x="300576" y="66027"/>
                   <a:ext cx="2408859" cy="660319"/>
                 </a:xfrm>
                 <a:prstGeom prst="rect">
@@ -10944,7 +11971,7 @@
                 <a:effectLst/>
                 <a:extLst>
                   <a:ext uri="{C572A759-6A51-4108-AA02-DFA0A04FC94B}">
-                    <ma14:wrappingTextBoxFlag xmlns="" xmlns:m="http://schemas.openxmlformats.org/officeDocument/2006/math" xmlns:a14="http://schemas.microsoft.com/office/drawing/2010/main" xmlns:ma14="http://schemas.microsoft.com/office/mac/drawingml/2011/main" val="1"/>
+                    <ma14:wrappingTextBoxFlag xmlns:ma14="http://schemas.microsoft.com/office/mac/drawingml/2011/main" xmlns:a14="http://schemas.microsoft.com/office/drawing/2010/main" xmlns:m="http://schemas.openxmlformats.org/officeDocument/2006/math" xmlns="" val="1"/>
                   </a:ext>
                 </a:extLst>
               </p:spPr>
@@ -10982,8 +12009,8 @@
             </p:nvSpPr>
             <p:spPr>
               <a:xfrm>
-                <a:off x="530090" y="213584"/>
-                <a:ext cx="10948324" cy="3283366"/>
+                <a:off x="185011" y="702841"/>
+                <a:ext cx="10948324" cy="2434456"/>
               </a:xfrm>
               <a:prstGeom prst="rect">
                 <a:avLst/>
@@ -10996,7 +12023,7 @@
               <a:effectLst/>
               <a:extLst>
                 <a:ext uri="{C572A759-6A51-4108-AA02-DFA0A04FC94B}">
-                  <ma14:wrappingTextBoxFlag xmlns="" xmlns:m="http://schemas.openxmlformats.org/officeDocument/2006/math" xmlns:a14="http://schemas.microsoft.com/office/drawing/2010/main" xmlns:ma14="http://schemas.microsoft.com/office/mac/drawingml/2011/main" val="1"/>
+                  <ma14:wrappingTextBoxFlag xmlns:ma14="http://schemas.microsoft.com/office/mac/drawingml/2011/main" xmlns:a14="http://schemas.microsoft.com/office/drawing/2010/main" xmlns:m="http://schemas.openxmlformats.org/officeDocument/2006/math" xmlns="" val="1"/>
                 </a:ext>
               </a:extLst>
             </p:spPr>
@@ -11018,70 +12045,120 @@
                 </a:lvl1pPr>
               </a:lstStyle>
               <a:p>
-                <a:r>
-                  <a:rPr lang="pt-BR" dirty="0" smtClean="0"/>
-                  <a:t>-Desenvolver </a:t>
-                </a:r>
-                <a:r>
-                  <a:rPr lang="pt-BR" dirty="0"/>
+                <a:pPr marL="457200" indent="-457200" algn="just">
+                  <a:buFont typeface="+mj-lt"/>
+                  <a:buAutoNum type="arabicPeriod"/>
+                </a:pPr>
+                <a:r>
+                  <a:rPr lang="pt-BR" sz="2000" dirty="0" smtClean="0"/>
+                  <a:t>Desenvolver </a:t>
+                </a:r>
+                <a:r>
+                  <a:rPr lang="pt-BR" sz="2000" dirty="0"/>
                   <a:t>um sistema seguro e eficiente para integrar dados bancários dos </a:t>
                 </a:r>
                 <a:r>
-                  <a:rPr lang="pt-BR" dirty="0" smtClean="0"/>
+                  <a:rPr lang="pt-BR" sz="2000" dirty="0" smtClean="0"/>
                   <a:t>usuários</a:t>
                 </a:r>
-                <a:endParaRPr lang="pt-BR" dirty="0"/>
+                <a:endParaRPr lang="pt-BR" sz="2000" dirty="0"/>
               </a:p>
               <a:p>
-                <a:r>
-                  <a:rPr lang="pt-BR" dirty="0"/>
-                  <a:t>-Garantia de Segurança dos Dados do Usuário</a:t>
-                </a:r>
-                <a:r>
-                  <a:rPr lang="pt-BR" dirty="0"/>
-                  <a:t/>
+                <a:pPr marL="457200" indent="-457200" algn="just">
+                  <a:buFont typeface="+mj-lt"/>
+                  <a:buAutoNum type="arabicPeriod"/>
+                </a:pPr>
+                <a:r>
+                  <a:rPr lang="pt-BR" sz="2000" dirty="0" smtClean="0"/>
+                  <a:t>Garantia </a:t>
+                </a:r>
+                <a:r>
+                  <a:rPr lang="pt-BR" sz="2000" dirty="0"/>
+                  <a:t>de Segurança dos Dados do Usuário</a:t>
                 </a:r>
                 <a:br>
-                  <a:rPr lang="pt-BR" dirty="0"/>
+                  <a:rPr lang="pt-BR" sz="2000" dirty="0"/>
                 </a:br>
                 <a:r>
-                  <a:rPr lang="pt-BR" dirty="0"/>
-                  <a:t>-Escalabilidade do Aplicativo</a:t>
-                </a:r>
-                <a:r>
-                  <a:rPr lang="pt-BR" dirty="0"/>
-                  <a:t/>
-                </a:r>
-                <a:br>
-                  <a:rPr lang="pt-BR" dirty="0"/>
-                </a:br>
-                <a:r>
-                  <a:rPr lang="pt-BR" dirty="0"/>
-                  <a:t>- Experiência de Usuário Satisfatória</a:t>
-                </a:r>
-                <a:r>
-                  <a:rPr lang="pt-BR" dirty="0"/>
-                  <a:t/>
-                </a:r>
-                <a:br>
-                  <a:rPr lang="pt-BR" dirty="0"/>
-                </a:br>
-                <a:r>
-                  <a:rPr lang="pt-BR" dirty="0"/>
-                  <a:t>-Educação Financeira dos Usuários</a:t>
-                </a:r>
-                <a:r>
-                  <a:rPr lang="pt-BR" dirty="0"/>
-                  <a:t/>
-                </a:r>
-                <a:br>
-                  <a:rPr lang="pt-BR" dirty="0"/>
-                </a:br>
-                <a:r>
-                  <a:rPr lang="pt-BR" dirty="0"/>
-                  <a:t>-Estratégia para Novas Funcionalidades</a:t>
-                </a:r>
-                <a:endParaRPr dirty="0"/>
+                  <a:rPr lang="pt-BR" sz="2000" dirty="0" smtClean="0"/>
+                  <a:t>Escalabilidade </a:t>
+                </a:r>
+                <a:r>
+                  <a:rPr lang="pt-BR" sz="2000" dirty="0"/>
+                  <a:t>do </a:t>
+                </a:r>
+                <a:r>
+                  <a:rPr lang="pt-BR" sz="2000" dirty="0" smtClean="0"/>
+                  <a:t>Aplicativo</a:t>
+                </a:r>
+              </a:p>
+              <a:p>
+                <a:pPr marL="457200" indent="-457200" algn="just">
+                  <a:buFont typeface="+mj-lt"/>
+                  <a:buAutoNum type="arabicPeriod"/>
+                </a:pPr>
+                <a:r>
+                  <a:rPr lang="pt-BR" sz="2000" dirty="0" smtClean="0"/>
+                  <a:t>Experiência </a:t>
+                </a:r>
+                <a:r>
+                  <a:rPr lang="pt-BR" sz="2000" dirty="0"/>
+                  <a:t>de Usuário </a:t>
+                </a:r>
+                <a:r>
+                  <a:rPr lang="pt-BR" sz="2000" dirty="0" smtClean="0"/>
+                  <a:t>Satisfatória</a:t>
+                </a:r>
+              </a:p>
+              <a:p>
+                <a:pPr marL="457200" indent="-457200" algn="just">
+                  <a:buFont typeface="+mj-lt"/>
+                  <a:buAutoNum type="arabicPeriod"/>
+                </a:pPr>
+                <a:r>
+                  <a:rPr lang="pt-BR" sz="2000" b="1" dirty="0" smtClean="0"/>
+                  <a:t>Educação </a:t>
+                </a:r>
+                <a:r>
+                  <a:rPr lang="pt-BR" sz="2000" b="1" dirty="0"/>
+                  <a:t>Financeira dos Usuários</a:t>
+                </a:r>
+                <a:r>
+                  <a:rPr lang="pt-BR" sz="2000" dirty="0"/>
+                  <a:t>: Criar conteúdos educativos e recursos interativos dentro do </a:t>
+                </a:r>
+                <a:r>
+                  <a:rPr lang="pt-BR" sz="2000" dirty="0" smtClean="0"/>
+                  <a:t>aplicativo.</a:t>
+                </a:r>
+                <a:endParaRPr lang="pt-BR" sz="2000" dirty="0"/>
+              </a:p>
+              <a:p>
+                <a:pPr marL="457200" indent="-457200" algn="just">
+                  <a:buFont typeface="+mj-lt"/>
+                  <a:buAutoNum type="arabicPeriod"/>
+                </a:pPr>
+                <a:r>
+                  <a:rPr lang="pt-BR" sz="2000" b="1" dirty="0" smtClean="0"/>
+                  <a:t>Estratégia </a:t>
+                </a:r>
+                <a:r>
+                  <a:rPr lang="pt-BR" sz="2000" b="1" dirty="0"/>
+                  <a:t>para Novas Funcionalidades</a:t>
+                </a:r>
+                <a:r>
+                  <a:rPr lang="pt-BR" sz="2000" dirty="0"/>
+                  <a:t>: Estabelecer um ciclo de feedback </a:t>
+                </a:r>
+                <a:r>
+                  <a:rPr lang="pt-BR" sz="2000" dirty="0" smtClean="0"/>
+                  <a:t>para </a:t>
+                </a:r>
+                <a:r>
+                  <a:rPr lang="pt-BR" sz="2000" dirty="0"/>
+                  <a:t>priorizar desenvolvimentos futuros.</a:t>
+                </a:r>
+                <a:endParaRPr sz="2000" dirty="0"/>
               </a:p>
             </p:txBody>
           </p:sp>
@@ -11228,7 +12305,7 @@
                 <a:effectLst/>
                 <a:extLst>
                   <a:ext uri="{C572A759-6A51-4108-AA02-DFA0A04FC94B}">
-                    <ma14:wrappingTextBoxFlag xmlns="" xmlns:m="http://schemas.openxmlformats.org/officeDocument/2006/math" xmlns:a14="http://schemas.microsoft.com/office/drawing/2010/main" xmlns:ma14="http://schemas.microsoft.com/office/mac/drawingml/2011/main" val="1"/>
+                    <ma14:wrappingTextBoxFlag xmlns:ma14="http://schemas.microsoft.com/office/mac/drawingml/2011/main" xmlns:a14="http://schemas.microsoft.com/office/drawing/2010/main" xmlns:m="http://schemas.openxmlformats.org/officeDocument/2006/math" xmlns="" val="1"/>
                   </a:ext>
                 </a:extLst>
               </p:spPr>
@@ -11281,7 +12358,7 @@
               <a:effectLst/>
               <a:extLst>
                 <a:ext uri="{C572A759-6A51-4108-AA02-DFA0A04FC94B}">
-                  <ma14:wrappingTextBoxFlag xmlns="" xmlns:m="http://schemas.openxmlformats.org/officeDocument/2006/math" xmlns:a14="http://schemas.microsoft.com/office/drawing/2010/main" xmlns:ma14="http://schemas.microsoft.com/office/mac/drawingml/2011/main" val="1"/>
+                  <ma14:wrappingTextBoxFlag xmlns:ma14="http://schemas.microsoft.com/office/mac/drawingml/2011/main" xmlns:a14="http://schemas.microsoft.com/office/drawing/2010/main" xmlns:m="http://schemas.openxmlformats.org/officeDocument/2006/math" xmlns="" val="1"/>
                 </a:ext>
               </a:extLst>
             </p:spPr>
@@ -11587,7 +12664,7 @@
                 <a:effectLst/>
                 <a:extLst>
                   <a:ext uri="{C572A759-6A51-4108-AA02-DFA0A04FC94B}">
-                    <ma14:wrappingTextBoxFlag xmlns="" xmlns:m="http://schemas.openxmlformats.org/officeDocument/2006/math" xmlns:a14="http://schemas.microsoft.com/office/drawing/2010/main" xmlns:ma14="http://schemas.microsoft.com/office/mac/drawingml/2011/main" val="1"/>
+                    <ma14:wrappingTextBoxFlag xmlns:ma14="http://schemas.microsoft.com/office/mac/drawingml/2011/main" xmlns:a14="http://schemas.microsoft.com/office/drawing/2010/main" xmlns:m="http://schemas.openxmlformats.org/officeDocument/2006/math" xmlns="" val="1"/>
                   </a:ext>
                 </a:extLst>
               </p:spPr>
@@ -11640,7 +12717,7 @@
               <a:effectLst/>
               <a:extLst>
                 <a:ext uri="{C572A759-6A51-4108-AA02-DFA0A04FC94B}">
-                  <ma14:wrappingTextBoxFlag xmlns="" xmlns:m="http://schemas.openxmlformats.org/officeDocument/2006/math" xmlns:a14="http://schemas.microsoft.com/office/drawing/2010/main" xmlns:ma14="http://schemas.microsoft.com/office/mac/drawingml/2011/main" val="1"/>
+                  <ma14:wrappingTextBoxFlag xmlns:ma14="http://schemas.microsoft.com/office/mac/drawingml/2011/main" xmlns:a14="http://schemas.microsoft.com/office/drawing/2010/main" xmlns:m="http://schemas.openxmlformats.org/officeDocument/2006/math" xmlns="" val="1"/>
                 </a:ext>
               </a:extLst>
             </p:spPr>
@@ -11784,7 +12861,7 @@
           <a:effectLst/>
           <a:extLst>
             <a:ext uri="{C572A759-6A51-4108-AA02-DFA0A04FC94B}">
-              <ma14:wrappingTextBoxFlag xmlns="" xmlns:m="http://schemas.openxmlformats.org/officeDocument/2006/math" xmlns:a14="http://schemas.microsoft.com/office/drawing/2010/main" xmlns:ma14="http://schemas.microsoft.com/office/mac/drawingml/2011/main" val="1"/>
+              <ma14:wrappingTextBoxFlag xmlns:ma14="http://schemas.microsoft.com/office/mac/drawingml/2011/main" xmlns:a14="http://schemas.microsoft.com/office/drawing/2010/main" xmlns:m="http://schemas.openxmlformats.org/officeDocument/2006/math" xmlns="" val="1"/>
             </a:ext>
           </a:extLst>
         </p:spPr>
@@ -11836,7 +12913,7 @@
           <a:effectLst/>
           <a:extLst>
             <a:ext uri="{C572A759-6A51-4108-AA02-DFA0A04FC94B}">
-              <ma14:wrappingTextBoxFlag xmlns="" xmlns:m="http://schemas.openxmlformats.org/officeDocument/2006/math" xmlns:a14="http://schemas.microsoft.com/office/drawing/2010/main" xmlns:ma14="http://schemas.microsoft.com/office/mac/drawingml/2011/main" val="1"/>
+              <ma14:wrappingTextBoxFlag xmlns:ma14="http://schemas.microsoft.com/office/mac/drawingml/2011/main" xmlns:a14="http://schemas.microsoft.com/office/drawing/2010/main" xmlns:m="http://schemas.openxmlformats.org/officeDocument/2006/math" xmlns="" val="1"/>
             </a:ext>
           </a:extLst>
         </p:spPr>
@@ -11890,7 +12967,7 @@
           <a:effectLst/>
           <a:extLst>
             <a:ext uri="{C572A759-6A51-4108-AA02-DFA0A04FC94B}">
-              <ma14:wrappingTextBoxFlag xmlns="" xmlns:m="http://schemas.openxmlformats.org/officeDocument/2006/math" xmlns:a14="http://schemas.microsoft.com/office/drawing/2010/main" xmlns:ma14="http://schemas.microsoft.com/office/mac/drawingml/2011/main" val="1"/>
+              <ma14:wrappingTextBoxFlag xmlns:ma14="http://schemas.microsoft.com/office/mac/drawingml/2011/main" xmlns:a14="http://schemas.microsoft.com/office/drawing/2010/main" xmlns:m="http://schemas.openxmlformats.org/officeDocument/2006/math" xmlns="" val="1"/>
             </a:ext>
           </a:extLst>
         </p:spPr>
@@ -11942,7 +13019,7 @@
           <a:effectLst/>
           <a:extLst>
             <a:ext uri="{C572A759-6A51-4108-AA02-DFA0A04FC94B}">
-              <ma14:wrappingTextBoxFlag xmlns="" xmlns:m="http://schemas.openxmlformats.org/officeDocument/2006/math" xmlns:a14="http://schemas.microsoft.com/office/drawing/2010/main" xmlns:ma14="http://schemas.microsoft.com/office/mac/drawingml/2011/main" val="1"/>
+              <ma14:wrappingTextBoxFlag xmlns:ma14="http://schemas.microsoft.com/office/mac/drawingml/2011/main" xmlns:a14="http://schemas.microsoft.com/office/drawing/2010/main" xmlns:m="http://schemas.openxmlformats.org/officeDocument/2006/math" xmlns="" val="1"/>
             </a:ext>
           </a:extLst>
         </p:spPr>
@@ -12115,7 +13192,7 @@
                 <a:effectLst/>
                 <a:extLst>
                   <a:ext uri="{C572A759-6A51-4108-AA02-DFA0A04FC94B}">
-                    <ma14:wrappingTextBoxFlag xmlns="" xmlns:m="http://schemas.openxmlformats.org/officeDocument/2006/math" xmlns:a14="http://schemas.microsoft.com/office/drawing/2010/main" xmlns:ma14="http://schemas.microsoft.com/office/mac/drawingml/2011/main" val="1"/>
+                    <ma14:wrappingTextBoxFlag xmlns:ma14="http://schemas.microsoft.com/office/mac/drawingml/2011/main" xmlns:a14="http://schemas.microsoft.com/office/drawing/2010/main" xmlns:m="http://schemas.openxmlformats.org/officeDocument/2006/math" xmlns="" val="1"/>
                   </a:ext>
                 </a:extLst>
               </p:spPr>
@@ -12168,7 +13245,7 @@
               <a:effectLst/>
               <a:extLst>
                 <a:ext uri="{C572A759-6A51-4108-AA02-DFA0A04FC94B}">
-                  <ma14:wrappingTextBoxFlag xmlns="" xmlns:m="http://schemas.openxmlformats.org/officeDocument/2006/math" xmlns:a14="http://schemas.microsoft.com/office/drawing/2010/main" xmlns:ma14="http://schemas.microsoft.com/office/mac/drawingml/2011/main" val="1"/>
+                  <ma14:wrappingTextBoxFlag xmlns:ma14="http://schemas.microsoft.com/office/mac/drawingml/2011/main" xmlns:a14="http://schemas.microsoft.com/office/drawing/2010/main" xmlns:m="http://schemas.openxmlformats.org/officeDocument/2006/math" xmlns="" val="1"/>
                 </a:ext>
               </a:extLst>
             </p:spPr>
@@ -12297,7 +13374,7 @@
                 <a:effectLst/>
                 <a:extLst>
                   <a:ext uri="{C572A759-6A51-4108-AA02-DFA0A04FC94B}">
-                    <ma14:wrappingTextBoxFlag xmlns="" xmlns:m="http://schemas.openxmlformats.org/officeDocument/2006/math" xmlns:a14="http://schemas.microsoft.com/office/drawing/2010/main" xmlns:ma14="http://schemas.microsoft.com/office/mac/drawingml/2011/main" val="1"/>
+                    <ma14:wrappingTextBoxFlag xmlns:ma14="http://schemas.microsoft.com/office/mac/drawingml/2011/main" xmlns:a14="http://schemas.microsoft.com/office/drawing/2010/main" xmlns:m="http://schemas.openxmlformats.org/officeDocument/2006/math" xmlns="" val="1"/>
                   </a:ext>
                 </a:extLst>
               </p:spPr>
@@ -12350,7 +13427,7 @@
               <a:effectLst/>
               <a:extLst>
                 <a:ext uri="{C572A759-6A51-4108-AA02-DFA0A04FC94B}">
-                  <ma14:wrappingTextBoxFlag xmlns="" xmlns:m="http://schemas.openxmlformats.org/officeDocument/2006/math" xmlns:a14="http://schemas.microsoft.com/office/drawing/2010/main" xmlns:ma14="http://schemas.microsoft.com/office/mac/drawingml/2011/main" val="1"/>
+                  <ma14:wrappingTextBoxFlag xmlns:ma14="http://schemas.microsoft.com/office/mac/drawingml/2011/main" xmlns:a14="http://schemas.microsoft.com/office/drawing/2010/main" xmlns:m="http://schemas.openxmlformats.org/officeDocument/2006/math" xmlns="" val="1"/>
                 </a:ext>
               </a:extLst>
             </p:spPr>
@@ -12494,7 +13571,7 @@
           <a:effectLst/>
           <a:extLst>
             <a:ext uri="{C572A759-6A51-4108-AA02-DFA0A04FC94B}">
-              <ma14:wrappingTextBoxFlag xmlns="" xmlns:m="http://schemas.openxmlformats.org/officeDocument/2006/math" xmlns:a14="http://schemas.microsoft.com/office/drawing/2010/main" xmlns:ma14="http://schemas.microsoft.com/office/mac/drawingml/2011/main" val="1"/>
+              <ma14:wrappingTextBoxFlag xmlns:ma14="http://schemas.microsoft.com/office/mac/drawingml/2011/main" xmlns:a14="http://schemas.microsoft.com/office/drawing/2010/main" xmlns:m="http://schemas.openxmlformats.org/officeDocument/2006/math" xmlns="" val="1"/>
             </a:ext>
           </a:extLst>
         </p:spPr>
@@ -12546,7 +13623,7 @@
           <a:effectLst/>
           <a:extLst>
             <a:ext uri="{C572A759-6A51-4108-AA02-DFA0A04FC94B}">
-              <ma14:wrappingTextBoxFlag xmlns="" xmlns:m="http://schemas.openxmlformats.org/officeDocument/2006/math" xmlns:a14="http://schemas.microsoft.com/office/drawing/2010/main" xmlns:ma14="http://schemas.microsoft.com/office/mac/drawingml/2011/main" val="1"/>
+              <ma14:wrappingTextBoxFlag xmlns:ma14="http://schemas.microsoft.com/office/mac/drawingml/2011/main" xmlns:a14="http://schemas.microsoft.com/office/drawing/2010/main" xmlns:m="http://schemas.openxmlformats.org/officeDocument/2006/math" xmlns="" val="1"/>
             </a:ext>
           </a:extLst>
         </p:spPr>
@@ -12600,7 +13677,7 @@
           <a:effectLst/>
           <a:extLst>
             <a:ext uri="{C572A759-6A51-4108-AA02-DFA0A04FC94B}">
-              <ma14:wrappingTextBoxFlag xmlns="" xmlns:m="http://schemas.openxmlformats.org/officeDocument/2006/math" xmlns:a14="http://schemas.microsoft.com/office/drawing/2010/main" xmlns:ma14="http://schemas.microsoft.com/office/mac/drawingml/2011/main" val="1"/>
+              <ma14:wrappingTextBoxFlag xmlns:ma14="http://schemas.microsoft.com/office/mac/drawingml/2011/main" xmlns:a14="http://schemas.microsoft.com/office/drawing/2010/main" xmlns:m="http://schemas.openxmlformats.org/officeDocument/2006/math" xmlns="" val="1"/>
             </a:ext>
           </a:extLst>
         </p:spPr>
@@ -12652,7 +13729,7 @@
           <a:effectLst/>
           <a:extLst>
             <a:ext uri="{C572A759-6A51-4108-AA02-DFA0A04FC94B}">
-              <ma14:wrappingTextBoxFlag xmlns="" xmlns:m="http://schemas.openxmlformats.org/officeDocument/2006/math" xmlns:a14="http://schemas.microsoft.com/office/drawing/2010/main" xmlns:ma14="http://schemas.microsoft.com/office/mac/drawingml/2011/main" val="1"/>
+              <ma14:wrappingTextBoxFlag xmlns:ma14="http://schemas.microsoft.com/office/mac/drawingml/2011/main" xmlns:a14="http://schemas.microsoft.com/office/drawing/2010/main" xmlns:m="http://schemas.openxmlformats.org/officeDocument/2006/math" xmlns="" val="1"/>
             </a:ext>
           </a:extLst>
         </p:spPr>
@@ -12818,7 +13895,7 @@
                 <a:effectLst/>
                 <a:extLst>
                   <a:ext uri="{C572A759-6A51-4108-AA02-DFA0A04FC94B}">
-                    <ma14:wrappingTextBoxFlag xmlns="" xmlns:m="http://schemas.openxmlformats.org/officeDocument/2006/math" xmlns:a14="http://schemas.microsoft.com/office/drawing/2010/main" xmlns:ma14="http://schemas.microsoft.com/office/mac/drawingml/2011/main" val="1"/>
+                    <ma14:wrappingTextBoxFlag xmlns:ma14="http://schemas.microsoft.com/office/mac/drawingml/2011/main" xmlns:a14="http://schemas.microsoft.com/office/drawing/2010/main" xmlns:m="http://schemas.openxmlformats.org/officeDocument/2006/math" xmlns="" val="1"/>
                   </a:ext>
                 </a:extLst>
               </p:spPr>
@@ -12871,7 +13948,7 @@
               <a:effectLst/>
               <a:extLst>
                 <a:ext uri="{C572A759-6A51-4108-AA02-DFA0A04FC94B}">
-                  <ma14:wrappingTextBoxFlag xmlns="" xmlns:m="http://schemas.openxmlformats.org/officeDocument/2006/math" xmlns:a14="http://schemas.microsoft.com/office/drawing/2010/main" xmlns:ma14="http://schemas.microsoft.com/office/mac/drawingml/2011/main" val="1"/>
+                  <ma14:wrappingTextBoxFlag xmlns:ma14="http://schemas.microsoft.com/office/mac/drawingml/2011/main" xmlns:a14="http://schemas.microsoft.com/office/drawing/2010/main" xmlns:m="http://schemas.openxmlformats.org/officeDocument/2006/math" xmlns="" val="1"/>
                 </a:ext>
               </a:extLst>
             </p:spPr>
@@ -13000,7 +14077,7 @@
                 <a:effectLst/>
                 <a:extLst>
                   <a:ext uri="{C572A759-6A51-4108-AA02-DFA0A04FC94B}">
-                    <ma14:wrappingTextBoxFlag xmlns="" xmlns:m="http://schemas.openxmlformats.org/officeDocument/2006/math" xmlns:a14="http://schemas.microsoft.com/office/drawing/2010/main" xmlns:ma14="http://schemas.microsoft.com/office/mac/drawingml/2011/main" val="1"/>
+                    <ma14:wrappingTextBoxFlag xmlns:ma14="http://schemas.microsoft.com/office/mac/drawingml/2011/main" xmlns:a14="http://schemas.microsoft.com/office/drawing/2010/main" xmlns:m="http://schemas.openxmlformats.org/officeDocument/2006/math" xmlns="" val="1"/>
                   </a:ext>
                 </a:extLst>
               </p:spPr>
@@ -13053,7 +14130,7 @@
               <a:effectLst/>
               <a:extLst>
                 <a:ext uri="{C572A759-6A51-4108-AA02-DFA0A04FC94B}">
-                  <ma14:wrappingTextBoxFlag xmlns="" xmlns:m="http://schemas.openxmlformats.org/officeDocument/2006/math" xmlns:a14="http://schemas.microsoft.com/office/drawing/2010/main" xmlns:ma14="http://schemas.microsoft.com/office/mac/drawingml/2011/main" val="1"/>
+                  <ma14:wrappingTextBoxFlag xmlns:ma14="http://schemas.microsoft.com/office/mac/drawingml/2011/main" xmlns:a14="http://schemas.microsoft.com/office/drawing/2010/main" xmlns:m="http://schemas.openxmlformats.org/officeDocument/2006/math" xmlns="" val="1"/>
                 </a:ext>
               </a:extLst>
             </p:spPr>
@@ -13197,7 +14274,7 @@
           <a:effectLst/>
           <a:extLst>
             <a:ext uri="{C572A759-6A51-4108-AA02-DFA0A04FC94B}">
-              <ma14:wrappingTextBoxFlag xmlns="" xmlns:m="http://schemas.openxmlformats.org/officeDocument/2006/math" xmlns:a14="http://schemas.microsoft.com/office/drawing/2010/main" xmlns:ma14="http://schemas.microsoft.com/office/mac/drawingml/2011/main" val="1"/>
+              <ma14:wrappingTextBoxFlag xmlns:ma14="http://schemas.microsoft.com/office/mac/drawingml/2011/main" xmlns:a14="http://schemas.microsoft.com/office/drawing/2010/main" xmlns:m="http://schemas.openxmlformats.org/officeDocument/2006/math" xmlns="" val="1"/>
             </a:ext>
           </a:extLst>
         </p:spPr>
@@ -13249,7 +14326,7 @@
           <a:effectLst/>
           <a:extLst>
             <a:ext uri="{C572A759-6A51-4108-AA02-DFA0A04FC94B}">
-              <ma14:wrappingTextBoxFlag xmlns="" xmlns:m="http://schemas.openxmlformats.org/officeDocument/2006/math" xmlns:a14="http://schemas.microsoft.com/office/drawing/2010/main" xmlns:ma14="http://schemas.microsoft.com/office/mac/drawingml/2011/main" val="1"/>
+              <ma14:wrappingTextBoxFlag xmlns:ma14="http://schemas.microsoft.com/office/mac/drawingml/2011/main" xmlns:a14="http://schemas.microsoft.com/office/drawing/2010/main" xmlns:m="http://schemas.openxmlformats.org/officeDocument/2006/math" xmlns="" val="1"/>
             </a:ext>
           </a:extLst>
         </p:spPr>
@@ -13303,7 +14380,7 @@
           <a:effectLst/>
           <a:extLst>
             <a:ext uri="{C572A759-6A51-4108-AA02-DFA0A04FC94B}">
-              <ma14:wrappingTextBoxFlag xmlns="" xmlns:m="http://schemas.openxmlformats.org/officeDocument/2006/math" xmlns:a14="http://schemas.microsoft.com/office/drawing/2010/main" xmlns:ma14="http://schemas.microsoft.com/office/mac/drawingml/2011/main" val="1"/>
+              <ma14:wrappingTextBoxFlag xmlns:ma14="http://schemas.microsoft.com/office/mac/drawingml/2011/main" xmlns:a14="http://schemas.microsoft.com/office/drawing/2010/main" xmlns:m="http://schemas.openxmlformats.org/officeDocument/2006/math" xmlns="" val="1"/>
             </a:ext>
           </a:extLst>
         </p:spPr>
@@ -13355,7 +14432,7 @@
           <a:effectLst/>
           <a:extLst>
             <a:ext uri="{C572A759-6A51-4108-AA02-DFA0A04FC94B}">
-              <ma14:wrappingTextBoxFlag xmlns="" xmlns:m="http://schemas.openxmlformats.org/officeDocument/2006/math" xmlns:a14="http://schemas.microsoft.com/office/drawing/2010/main" xmlns:ma14="http://schemas.microsoft.com/office/mac/drawingml/2011/main" val="1"/>
+              <ma14:wrappingTextBoxFlag xmlns:ma14="http://schemas.microsoft.com/office/mac/drawingml/2011/main" xmlns:a14="http://schemas.microsoft.com/office/drawing/2010/main" xmlns:m="http://schemas.openxmlformats.org/officeDocument/2006/math" xmlns="" val="1"/>
             </a:ext>
           </a:extLst>
         </p:spPr>
@@ -13521,7 +14598,7 @@
                 <a:effectLst/>
                 <a:extLst>
                   <a:ext uri="{C572A759-6A51-4108-AA02-DFA0A04FC94B}">
-                    <ma14:wrappingTextBoxFlag xmlns="" xmlns:m="http://schemas.openxmlformats.org/officeDocument/2006/math" xmlns:a14="http://schemas.microsoft.com/office/drawing/2010/main" xmlns:ma14="http://schemas.microsoft.com/office/mac/drawingml/2011/main" val="1"/>
+                    <ma14:wrappingTextBoxFlag xmlns:ma14="http://schemas.microsoft.com/office/mac/drawingml/2011/main" xmlns:a14="http://schemas.microsoft.com/office/drawing/2010/main" xmlns:m="http://schemas.openxmlformats.org/officeDocument/2006/math" xmlns="" val="1"/>
                   </a:ext>
                 </a:extLst>
               </p:spPr>
@@ -13574,7 +14651,7 @@
               <a:effectLst/>
               <a:extLst>
                 <a:ext uri="{C572A759-6A51-4108-AA02-DFA0A04FC94B}">
-                  <ma14:wrappingTextBoxFlag xmlns="" xmlns:m="http://schemas.openxmlformats.org/officeDocument/2006/math" xmlns:a14="http://schemas.microsoft.com/office/drawing/2010/main" xmlns:ma14="http://schemas.microsoft.com/office/mac/drawingml/2011/main" val="1"/>
+                  <ma14:wrappingTextBoxFlag xmlns:ma14="http://schemas.microsoft.com/office/mac/drawingml/2011/main" xmlns:a14="http://schemas.microsoft.com/office/drawing/2010/main" xmlns:m="http://schemas.openxmlformats.org/officeDocument/2006/math" xmlns="" val="1"/>
                 </a:ext>
               </a:extLst>
             </p:spPr>
@@ -13703,7 +14780,7 @@
                 <a:effectLst/>
                 <a:extLst>
                   <a:ext uri="{C572A759-6A51-4108-AA02-DFA0A04FC94B}">
-                    <ma14:wrappingTextBoxFlag xmlns="" xmlns:m="http://schemas.openxmlformats.org/officeDocument/2006/math" xmlns:a14="http://schemas.microsoft.com/office/drawing/2010/main" xmlns:ma14="http://schemas.microsoft.com/office/mac/drawingml/2011/main" val="1"/>
+                    <ma14:wrappingTextBoxFlag xmlns:ma14="http://schemas.microsoft.com/office/mac/drawingml/2011/main" xmlns:a14="http://schemas.microsoft.com/office/drawing/2010/main" xmlns:m="http://schemas.openxmlformats.org/officeDocument/2006/math" xmlns="" val="1"/>
                   </a:ext>
                 </a:extLst>
               </p:spPr>
@@ -13756,7 +14833,7 @@
               <a:effectLst/>
               <a:extLst>
                 <a:ext uri="{C572A759-6A51-4108-AA02-DFA0A04FC94B}">
-                  <ma14:wrappingTextBoxFlag xmlns="" xmlns:m="http://schemas.openxmlformats.org/officeDocument/2006/math" xmlns:a14="http://schemas.microsoft.com/office/drawing/2010/main" xmlns:ma14="http://schemas.microsoft.com/office/mac/drawingml/2011/main" val="1"/>
+                  <ma14:wrappingTextBoxFlag xmlns:ma14="http://schemas.microsoft.com/office/mac/drawingml/2011/main" xmlns:a14="http://schemas.microsoft.com/office/drawing/2010/main" xmlns:m="http://schemas.openxmlformats.org/officeDocument/2006/math" xmlns="" val="1"/>
                 </a:ext>
               </a:extLst>
             </p:spPr>
@@ -13900,7 +14977,7 @@
           <a:effectLst/>
           <a:extLst>
             <a:ext uri="{C572A759-6A51-4108-AA02-DFA0A04FC94B}">
-              <ma14:wrappingTextBoxFlag xmlns="" xmlns:m="http://schemas.openxmlformats.org/officeDocument/2006/math" xmlns:a14="http://schemas.microsoft.com/office/drawing/2010/main" xmlns:ma14="http://schemas.microsoft.com/office/mac/drawingml/2011/main" val="1"/>
+              <ma14:wrappingTextBoxFlag xmlns:ma14="http://schemas.microsoft.com/office/mac/drawingml/2011/main" xmlns:a14="http://schemas.microsoft.com/office/drawing/2010/main" xmlns:m="http://schemas.openxmlformats.org/officeDocument/2006/math" xmlns="" val="1"/>
             </a:ext>
           </a:extLst>
         </p:spPr>
@@ -13952,7 +15029,7 @@
           <a:effectLst/>
           <a:extLst>
             <a:ext uri="{C572A759-6A51-4108-AA02-DFA0A04FC94B}">
-              <ma14:wrappingTextBoxFlag xmlns="" xmlns:m="http://schemas.openxmlformats.org/officeDocument/2006/math" xmlns:a14="http://schemas.microsoft.com/office/drawing/2010/main" xmlns:ma14="http://schemas.microsoft.com/office/mac/drawingml/2011/main" val="1"/>
+              <ma14:wrappingTextBoxFlag xmlns:ma14="http://schemas.microsoft.com/office/mac/drawingml/2011/main" xmlns:a14="http://schemas.microsoft.com/office/drawing/2010/main" xmlns:m="http://schemas.openxmlformats.org/officeDocument/2006/math" xmlns="" val="1"/>
             </a:ext>
           </a:extLst>
         </p:spPr>
@@ -14006,7 +15083,7 @@
           <a:effectLst/>
           <a:extLst>
             <a:ext uri="{C572A759-6A51-4108-AA02-DFA0A04FC94B}">
-              <ma14:wrappingTextBoxFlag xmlns="" xmlns:m="http://schemas.openxmlformats.org/officeDocument/2006/math" xmlns:a14="http://schemas.microsoft.com/office/drawing/2010/main" xmlns:ma14="http://schemas.microsoft.com/office/mac/drawingml/2011/main" val="1"/>
+              <ma14:wrappingTextBoxFlag xmlns:ma14="http://schemas.microsoft.com/office/mac/drawingml/2011/main" xmlns:a14="http://schemas.microsoft.com/office/drawing/2010/main" xmlns:m="http://schemas.openxmlformats.org/officeDocument/2006/math" xmlns="" val="1"/>
             </a:ext>
           </a:extLst>
         </p:spPr>
@@ -14058,7 +15135,7 @@
           <a:effectLst/>
           <a:extLst>
             <a:ext uri="{C572A759-6A51-4108-AA02-DFA0A04FC94B}">
-              <ma14:wrappingTextBoxFlag xmlns="" xmlns:m="http://schemas.openxmlformats.org/officeDocument/2006/math" xmlns:a14="http://schemas.microsoft.com/office/drawing/2010/main" xmlns:ma14="http://schemas.microsoft.com/office/mac/drawingml/2011/main" val="1"/>
+              <ma14:wrappingTextBoxFlag xmlns:ma14="http://schemas.microsoft.com/office/mac/drawingml/2011/main" xmlns:a14="http://schemas.microsoft.com/office/drawing/2010/main" xmlns:m="http://schemas.openxmlformats.org/officeDocument/2006/math" xmlns="" val="1"/>
             </a:ext>
           </a:extLst>
         </p:spPr>
@@ -14224,7 +15301,7 @@
                 <a:effectLst/>
                 <a:extLst>
                   <a:ext uri="{C572A759-6A51-4108-AA02-DFA0A04FC94B}">
-                    <ma14:wrappingTextBoxFlag xmlns="" xmlns:m="http://schemas.openxmlformats.org/officeDocument/2006/math" xmlns:a14="http://schemas.microsoft.com/office/drawing/2010/main" xmlns:ma14="http://schemas.microsoft.com/office/mac/drawingml/2011/main" val="1"/>
+                    <ma14:wrappingTextBoxFlag xmlns:ma14="http://schemas.microsoft.com/office/mac/drawingml/2011/main" xmlns:a14="http://schemas.microsoft.com/office/drawing/2010/main" xmlns:m="http://schemas.openxmlformats.org/officeDocument/2006/math" xmlns="" val="1"/>
                   </a:ext>
                 </a:extLst>
               </p:spPr>
@@ -14277,7 +15354,7 @@
               <a:effectLst/>
               <a:extLst>
                 <a:ext uri="{C572A759-6A51-4108-AA02-DFA0A04FC94B}">
-                  <ma14:wrappingTextBoxFlag xmlns="" xmlns:m="http://schemas.openxmlformats.org/officeDocument/2006/math" xmlns:a14="http://schemas.microsoft.com/office/drawing/2010/main" xmlns:ma14="http://schemas.microsoft.com/office/mac/drawingml/2011/main" val="1"/>
+                  <ma14:wrappingTextBoxFlag xmlns:ma14="http://schemas.microsoft.com/office/mac/drawingml/2011/main" xmlns:a14="http://schemas.microsoft.com/office/drawing/2010/main" xmlns:m="http://schemas.openxmlformats.org/officeDocument/2006/math" xmlns="" val="1"/>
                 </a:ext>
               </a:extLst>
             </p:spPr>
@@ -14406,7 +15483,7 @@
                 <a:effectLst/>
                 <a:extLst>
                   <a:ext uri="{C572A759-6A51-4108-AA02-DFA0A04FC94B}">
-                    <ma14:wrappingTextBoxFlag xmlns="" xmlns:m="http://schemas.openxmlformats.org/officeDocument/2006/math" xmlns:a14="http://schemas.microsoft.com/office/drawing/2010/main" xmlns:ma14="http://schemas.microsoft.com/office/mac/drawingml/2011/main" val="1"/>
+                    <ma14:wrappingTextBoxFlag xmlns:ma14="http://schemas.microsoft.com/office/mac/drawingml/2011/main" xmlns:a14="http://schemas.microsoft.com/office/drawing/2010/main" xmlns:m="http://schemas.openxmlformats.org/officeDocument/2006/math" xmlns="" val="1"/>
                   </a:ext>
                 </a:extLst>
               </p:spPr>
@@ -14459,7 +15536,7 @@
               <a:effectLst/>
               <a:extLst>
                 <a:ext uri="{C572A759-6A51-4108-AA02-DFA0A04FC94B}">
-                  <ma14:wrappingTextBoxFlag xmlns="" xmlns:m="http://schemas.openxmlformats.org/officeDocument/2006/math" xmlns:a14="http://schemas.microsoft.com/office/drawing/2010/main" xmlns:ma14="http://schemas.microsoft.com/office/mac/drawingml/2011/main" val="1"/>
+                  <ma14:wrappingTextBoxFlag xmlns:ma14="http://schemas.microsoft.com/office/mac/drawingml/2011/main" xmlns:a14="http://schemas.microsoft.com/office/drawing/2010/main" xmlns:m="http://schemas.openxmlformats.org/officeDocument/2006/math" xmlns="" val="1"/>
                 </a:ext>
               </a:extLst>
             </p:spPr>
@@ -14603,7 +15680,7 @@
           <a:effectLst/>
           <a:extLst>
             <a:ext uri="{C572A759-6A51-4108-AA02-DFA0A04FC94B}">
-              <ma14:wrappingTextBoxFlag xmlns="" xmlns:m="http://schemas.openxmlformats.org/officeDocument/2006/math" xmlns:a14="http://schemas.microsoft.com/office/drawing/2010/main" xmlns:ma14="http://schemas.microsoft.com/office/mac/drawingml/2011/main" val="1"/>
+              <ma14:wrappingTextBoxFlag xmlns:ma14="http://schemas.microsoft.com/office/mac/drawingml/2011/main" xmlns:a14="http://schemas.microsoft.com/office/drawing/2010/main" xmlns:m="http://schemas.openxmlformats.org/officeDocument/2006/math" xmlns="" val="1"/>
             </a:ext>
           </a:extLst>
         </p:spPr>
@@ -14655,7 +15732,7 @@
           <a:effectLst/>
           <a:extLst>
             <a:ext uri="{C572A759-6A51-4108-AA02-DFA0A04FC94B}">
-              <ma14:wrappingTextBoxFlag xmlns="" xmlns:m="http://schemas.openxmlformats.org/officeDocument/2006/math" xmlns:a14="http://schemas.microsoft.com/office/drawing/2010/main" xmlns:ma14="http://schemas.microsoft.com/office/mac/drawingml/2011/main" val="1"/>
+              <ma14:wrappingTextBoxFlag xmlns:ma14="http://schemas.microsoft.com/office/mac/drawingml/2011/main" xmlns:a14="http://schemas.microsoft.com/office/drawing/2010/main" xmlns:m="http://schemas.openxmlformats.org/officeDocument/2006/math" xmlns="" val="1"/>
             </a:ext>
           </a:extLst>
         </p:spPr>
@@ -14709,7 +15786,7 @@
           <a:effectLst/>
           <a:extLst>
             <a:ext uri="{C572A759-6A51-4108-AA02-DFA0A04FC94B}">
-              <ma14:wrappingTextBoxFlag xmlns="" xmlns:m="http://schemas.openxmlformats.org/officeDocument/2006/math" xmlns:a14="http://schemas.microsoft.com/office/drawing/2010/main" xmlns:ma14="http://schemas.microsoft.com/office/mac/drawingml/2011/main" val="1"/>
+              <ma14:wrappingTextBoxFlag xmlns:ma14="http://schemas.microsoft.com/office/mac/drawingml/2011/main" xmlns:a14="http://schemas.microsoft.com/office/drawing/2010/main" xmlns:m="http://schemas.openxmlformats.org/officeDocument/2006/math" xmlns="" val="1"/>
             </a:ext>
           </a:extLst>
         </p:spPr>
@@ -14761,7 +15838,7 @@
           <a:effectLst/>
           <a:extLst>
             <a:ext uri="{C572A759-6A51-4108-AA02-DFA0A04FC94B}">
-              <ma14:wrappingTextBoxFlag xmlns="" xmlns:m="http://schemas.openxmlformats.org/officeDocument/2006/math" xmlns:a14="http://schemas.microsoft.com/office/drawing/2010/main" xmlns:ma14="http://schemas.microsoft.com/office/mac/drawingml/2011/main" val="1"/>
+              <ma14:wrappingTextBoxFlag xmlns:ma14="http://schemas.microsoft.com/office/mac/drawingml/2011/main" xmlns:a14="http://schemas.microsoft.com/office/drawing/2010/main" xmlns:m="http://schemas.openxmlformats.org/officeDocument/2006/math" xmlns="" val="1"/>
             </a:ext>
           </a:extLst>
         </p:spPr>
@@ -14927,7 +16004,7 @@
                 <a:effectLst/>
                 <a:extLst>
                   <a:ext uri="{C572A759-6A51-4108-AA02-DFA0A04FC94B}">
-                    <ma14:wrappingTextBoxFlag xmlns="" xmlns:m="http://schemas.openxmlformats.org/officeDocument/2006/math" xmlns:a14="http://schemas.microsoft.com/office/drawing/2010/main" xmlns:ma14="http://schemas.microsoft.com/office/mac/drawingml/2011/main" val="1"/>
+                    <ma14:wrappingTextBoxFlag xmlns:ma14="http://schemas.microsoft.com/office/mac/drawingml/2011/main" xmlns:a14="http://schemas.microsoft.com/office/drawing/2010/main" xmlns:m="http://schemas.openxmlformats.org/officeDocument/2006/math" xmlns="" val="1"/>
                   </a:ext>
                 </a:extLst>
               </p:spPr>
@@ -14980,7 +16057,7 @@
               <a:effectLst/>
               <a:extLst>
                 <a:ext uri="{C572A759-6A51-4108-AA02-DFA0A04FC94B}">
-                  <ma14:wrappingTextBoxFlag xmlns="" xmlns:m="http://schemas.openxmlformats.org/officeDocument/2006/math" xmlns:a14="http://schemas.microsoft.com/office/drawing/2010/main" xmlns:ma14="http://schemas.microsoft.com/office/mac/drawingml/2011/main" val="1"/>
+                  <ma14:wrappingTextBoxFlag xmlns:ma14="http://schemas.microsoft.com/office/mac/drawingml/2011/main" xmlns:a14="http://schemas.microsoft.com/office/drawing/2010/main" xmlns:m="http://schemas.openxmlformats.org/officeDocument/2006/math" xmlns="" val="1"/>
                 </a:ext>
               </a:extLst>
             </p:spPr>
@@ -15109,7 +16186,7 @@
                 <a:effectLst/>
                 <a:extLst>
                   <a:ext uri="{C572A759-6A51-4108-AA02-DFA0A04FC94B}">
-                    <ma14:wrappingTextBoxFlag xmlns="" xmlns:m="http://schemas.openxmlformats.org/officeDocument/2006/math" xmlns:a14="http://schemas.microsoft.com/office/drawing/2010/main" xmlns:ma14="http://schemas.microsoft.com/office/mac/drawingml/2011/main" val="1"/>
+                    <ma14:wrappingTextBoxFlag xmlns:ma14="http://schemas.microsoft.com/office/mac/drawingml/2011/main" xmlns:a14="http://schemas.microsoft.com/office/drawing/2010/main" xmlns:m="http://schemas.openxmlformats.org/officeDocument/2006/math" xmlns="" val="1"/>
                   </a:ext>
                 </a:extLst>
               </p:spPr>
@@ -15162,7 +16239,7 @@
               <a:effectLst/>
               <a:extLst>
                 <a:ext uri="{C572A759-6A51-4108-AA02-DFA0A04FC94B}">
-                  <ma14:wrappingTextBoxFlag xmlns="" xmlns:m="http://schemas.openxmlformats.org/officeDocument/2006/math" xmlns:a14="http://schemas.microsoft.com/office/drawing/2010/main" xmlns:ma14="http://schemas.microsoft.com/office/mac/drawingml/2011/main" val="1"/>
+                  <ma14:wrappingTextBoxFlag xmlns:ma14="http://schemas.microsoft.com/office/mac/drawingml/2011/main" xmlns:a14="http://schemas.microsoft.com/office/drawing/2010/main" xmlns:m="http://schemas.openxmlformats.org/officeDocument/2006/math" xmlns="" val="1"/>
                 </a:ext>
               </a:extLst>
             </p:spPr>
@@ -15306,7 +16383,7 @@
           <a:effectLst/>
           <a:extLst>
             <a:ext uri="{C572A759-6A51-4108-AA02-DFA0A04FC94B}">
-              <ma14:wrappingTextBoxFlag xmlns="" xmlns:m="http://schemas.openxmlformats.org/officeDocument/2006/math" xmlns:a14="http://schemas.microsoft.com/office/drawing/2010/main" xmlns:ma14="http://schemas.microsoft.com/office/mac/drawingml/2011/main" val="1"/>
+              <ma14:wrappingTextBoxFlag xmlns:ma14="http://schemas.microsoft.com/office/mac/drawingml/2011/main" xmlns:a14="http://schemas.microsoft.com/office/drawing/2010/main" xmlns:m="http://schemas.openxmlformats.org/officeDocument/2006/math" xmlns="" val="1"/>
             </a:ext>
           </a:extLst>
         </p:spPr>
@@ -15358,7 +16435,7 @@
           <a:effectLst/>
           <a:extLst>
             <a:ext uri="{C572A759-6A51-4108-AA02-DFA0A04FC94B}">
-              <ma14:wrappingTextBoxFlag xmlns="" xmlns:m="http://schemas.openxmlformats.org/officeDocument/2006/math" xmlns:a14="http://schemas.microsoft.com/office/drawing/2010/main" xmlns:ma14="http://schemas.microsoft.com/office/mac/drawingml/2011/main" val="1"/>
+              <ma14:wrappingTextBoxFlag xmlns:ma14="http://schemas.microsoft.com/office/mac/drawingml/2011/main" xmlns:a14="http://schemas.microsoft.com/office/drawing/2010/main" xmlns:m="http://schemas.openxmlformats.org/officeDocument/2006/math" xmlns="" val="1"/>
             </a:ext>
           </a:extLst>
         </p:spPr>
@@ -15412,7 +16489,7 @@
           <a:effectLst/>
           <a:extLst>
             <a:ext uri="{C572A759-6A51-4108-AA02-DFA0A04FC94B}">
-              <ma14:wrappingTextBoxFlag xmlns="" xmlns:m="http://schemas.openxmlformats.org/officeDocument/2006/math" xmlns:a14="http://schemas.microsoft.com/office/drawing/2010/main" xmlns:ma14="http://schemas.microsoft.com/office/mac/drawingml/2011/main" val="1"/>
+              <ma14:wrappingTextBoxFlag xmlns:ma14="http://schemas.microsoft.com/office/mac/drawingml/2011/main" xmlns:a14="http://schemas.microsoft.com/office/drawing/2010/main" xmlns:m="http://schemas.openxmlformats.org/officeDocument/2006/math" xmlns="" val="1"/>
             </a:ext>
           </a:extLst>
         </p:spPr>
@@ -15464,7 +16541,7 @@
           <a:effectLst/>
           <a:extLst>
             <a:ext uri="{C572A759-6A51-4108-AA02-DFA0A04FC94B}">
-              <ma14:wrappingTextBoxFlag xmlns="" xmlns:m="http://schemas.openxmlformats.org/officeDocument/2006/math" xmlns:a14="http://schemas.microsoft.com/office/drawing/2010/main" xmlns:ma14="http://schemas.microsoft.com/office/mac/drawingml/2011/main" val="1"/>
+              <ma14:wrappingTextBoxFlag xmlns:ma14="http://schemas.microsoft.com/office/mac/drawingml/2011/main" xmlns:a14="http://schemas.microsoft.com/office/drawing/2010/main" xmlns:m="http://schemas.openxmlformats.org/officeDocument/2006/math" xmlns="" val="1"/>
             </a:ext>
           </a:extLst>
         </p:spPr>

</xml_diff>